<commit_message>
parameters to report and add plot number samples
</commit_message>
<xml_diff>
--- a/doc/20250915_Olink_Soma.pptx
+++ b/doc/20250915_Olink_Soma.pptx
@@ -5,20 +5,26 @@
     <p:sldMasterId id="2147483689" r:id="rId1"/>
   </p:sldMasterIdLst>
   <p:notesMasterIdLst>
-    <p:notesMasterId r:id="rId13"/>
+    <p:notesMasterId r:id="rId19"/>
   </p:notesMasterIdLst>
   <p:sldIdLst>
     <p:sldId id="2038389243" r:id="rId2"/>
     <p:sldId id="2038388716" r:id="rId3"/>
-    <p:sldId id="2038389238" r:id="rId4"/>
-    <p:sldId id="2038389239" r:id="rId5"/>
-    <p:sldId id="2038389220" r:id="rId6"/>
-    <p:sldId id="2038389240" r:id="rId7"/>
-    <p:sldId id="2038389241" r:id="rId8"/>
-    <p:sldId id="2038389244" r:id="rId9"/>
-    <p:sldId id="2038389245" r:id="rId10"/>
-    <p:sldId id="2038389242" r:id="rId11"/>
-    <p:sldId id="2038389237" r:id="rId12"/>
+    <p:sldId id="2038389249" r:id="rId4"/>
+    <p:sldId id="2038389238" r:id="rId5"/>
+    <p:sldId id="2038389246" r:id="rId6"/>
+    <p:sldId id="2038389247" r:id="rId7"/>
+    <p:sldId id="2038389248" r:id="rId8"/>
+    <p:sldId id="2038389239" r:id="rId9"/>
+    <p:sldId id="2038389250" r:id="rId10"/>
+    <p:sldId id="2038389251" r:id="rId11"/>
+    <p:sldId id="2038389220" r:id="rId12"/>
+    <p:sldId id="2038389240" r:id="rId13"/>
+    <p:sldId id="2038389241" r:id="rId14"/>
+    <p:sldId id="2038389244" r:id="rId15"/>
+    <p:sldId id="2038389245" r:id="rId16"/>
+    <p:sldId id="2038389242" r:id="rId17"/>
+    <p:sldId id="2038389237" r:id="rId18"/>
   </p:sldIdLst>
   <p:sldSz cx="12192000" cy="6858000"/>
   <p:notesSz cx="6858000" cy="9144000"/>
@@ -128,7 +134,7 @@
 <file path=ppt/revisionInfo.xml><?xml version="1.0" encoding="utf-8"?>
 <p1510:revInfo xmlns:a="http://schemas.openxmlformats.org/drawingml/2006/main" xmlns:r="http://schemas.openxmlformats.org/officeDocument/2006/relationships" xmlns:p1510="http://schemas.microsoft.com/office/powerpoint/2015/10/main">
   <p1510:revLst>
-    <p1510:client id="{1AAA029F-25BB-A845-996F-896549B7FE56}" v="12" dt="2025-09-16T05:00:20.446"/>
+    <p1510:client id="{1AAA029F-25BB-A845-996F-896549B7FE56}" v="21" dt="2025-09-18T08:21:31.379"/>
   </p1510:revLst>
 </p1510:revInfo>
 </file>
@@ -138,12 +144,12 @@
   <pc:docChgLst>
     <pc:chgData name="Maria Bueno Alvez" userId="f93260c4-fd88-4e6f-a65f-5c9220daa250" providerId="ADAL" clId="{7B4DC07F-E7C2-5C5D-BC7C-305545810802}"/>
     <pc:docChg chg="undo custSel addSld delSld modSld sldOrd">
-      <pc:chgData name="Maria Bueno Alvez" userId="f93260c4-fd88-4e6f-a65f-5c9220daa250" providerId="ADAL" clId="{7B4DC07F-E7C2-5C5D-BC7C-305545810802}" dt="2025-09-16T05:00:38.301" v="301" actId="1076"/>
+      <pc:chgData name="Maria Bueno Alvez" userId="f93260c4-fd88-4e6f-a65f-5c9220daa250" providerId="ADAL" clId="{7B4DC07F-E7C2-5C5D-BC7C-305545810802}" dt="2025-09-18T08:21:36.411" v="416" actId="20577"/>
       <pc:docMkLst>
         <pc:docMk/>
       </pc:docMkLst>
       <pc:sldChg chg="addSp delSp modSp mod ord">
-        <pc:chgData name="Maria Bueno Alvez" userId="f93260c4-fd88-4e6f-a65f-5c9220daa250" providerId="ADAL" clId="{7B4DC07F-E7C2-5C5D-BC7C-305545810802}" dt="2025-09-16T05:00:38.301" v="301" actId="1076"/>
+        <pc:chgData name="Maria Bueno Alvez" userId="f93260c4-fd88-4e6f-a65f-5c9220daa250" providerId="ADAL" clId="{7B4DC07F-E7C2-5C5D-BC7C-305545810802}" dt="2025-09-18T08:20:27.230" v="371" actId="1076"/>
         <pc:sldMkLst>
           <pc:docMk/>
           <pc:sldMk cId="298371368" sldId="2038388716"/>
@@ -156,16 +162,16 @@
             <ac:spMk id="2" creationId="{00000000-0000-0000-0000-000000000000}"/>
           </ac:spMkLst>
         </pc:spChg>
-        <pc:spChg chg="del">
-          <ac:chgData name="Maria Bueno Alvez" userId="f93260c4-fd88-4e6f-a65f-5c9220daa250" providerId="ADAL" clId="{7B4DC07F-E7C2-5C5D-BC7C-305545810802}" dt="2025-09-15T09:51:29.267" v="64" actId="478"/>
+        <pc:spChg chg="add del mod">
+          <ac:chgData name="Maria Bueno Alvez" userId="f93260c4-fd88-4e6f-a65f-5c9220daa250" providerId="ADAL" clId="{7B4DC07F-E7C2-5C5D-BC7C-305545810802}" dt="2025-09-18T08:20:23.353" v="370" actId="478"/>
           <ac:spMkLst>
             <pc:docMk/>
             <pc:sldMk cId="298371368" sldId="2038388716"/>
-            <ac:spMk id="6" creationId="{2464691A-4879-FFDB-595F-0E0AE1577CA1}"/>
+            <ac:spMk id="3" creationId="{6D094463-42CC-3301-B128-3CE830C01318}"/>
           </ac:spMkLst>
         </pc:spChg>
         <pc:picChg chg="add mod modCrop">
-          <ac:chgData name="Maria Bueno Alvez" userId="f93260c4-fd88-4e6f-a65f-5c9220daa250" providerId="ADAL" clId="{7B4DC07F-E7C2-5C5D-BC7C-305545810802}" dt="2025-09-16T05:00:38.301" v="301" actId="1076"/>
+          <ac:chgData name="Maria Bueno Alvez" userId="f93260c4-fd88-4e6f-a65f-5c9220daa250" providerId="ADAL" clId="{7B4DC07F-E7C2-5C5D-BC7C-305545810802}" dt="2025-09-18T08:20:27.230" v="371" actId="1076"/>
           <ac:picMkLst>
             <pc:docMk/>
             <pc:sldMk cId="298371368" sldId="2038388716"/>
@@ -383,17 +389,9 @@
           <pc:docMk/>
           <pc:sldMk cId="789172237" sldId="2038389238"/>
         </pc:sldMkLst>
-        <pc:spChg chg="mod">
-          <ac:chgData name="Maria Bueno Alvez" userId="f93260c4-fd88-4e6f-a65f-5c9220daa250" providerId="ADAL" clId="{7B4DC07F-E7C2-5C5D-BC7C-305545810802}" dt="2025-09-15T09:51:21.400" v="44" actId="20577"/>
-          <ac:spMkLst>
-            <pc:docMk/>
-            <pc:sldMk cId="789172237" sldId="2038389238"/>
-            <ac:spMk id="2" creationId="{A5DFCDC3-BD02-F255-C8EC-A18623114F06}"/>
-          </ac:spMkLst>
-        </pc:spChg>
       </pc:sldChg>
-      <pc:sldChg chg="modSp add mod">
-        <pc:chgData name="Maria Bueno Alvez" userId="f93260c4-fd88-4e6f-a65f-5c9220daa250" providerId="ADAL" clId="{7B4DC07F-E7C2-5C5D-BC7C-305545810802}" dt="2025-09-15T09:51:33.967" v="70" actId="20577"/>
+      <pc:sldChg chg="addSp modSp add mod">
+        <pc:chgData name="Maria Bueno Alvez" userId="f93260c4-fd88-4e6f-a65f-5c9220daa250" providerId="ADAL" clId="{7B4DC07F-E7C2-5C5D-BC7C-305545810802}" dt="2025-09-18T06:51:35.846" v="310" actId="1076"/>
         <pc:sldMkLst>
           <pc:docMk/>
           <pc:sldMk cId="3532534248" sldId="2038389238"/>
@@ -406,6 +404,14 @@
             <ac:spMk id="2" creationId="{F483FA19-A341-BAB5-8BFF-22BF27A6D1F4}"/>
           </ac:spMkLst>
         </pc:spChg>
+        <pc:picChg chg="add mod">
+          <ac:chgData name="Maria Bueno Alvez" userId="f93260c4-fd88-4e6f-a65f-5c9220daa250" providerId="ADAL" clId="{7B4DC07F-E7C2-5C5D-BC7C-305545810802}" dt="2025-09-18T06:51:35.846" v="310" actId="1076"/>
+          <ac:picMkLst>
+            <pc:docMk/>
+            <pc:sldMk cId="3532534248" sldId="2038389238"/>
+            <ac:picMk id="4" creationId="{C157FDC6-DF78-F62C-11F3-C0AE70D694ED}"/>
+          </ac:picMkLst>
+        </pc:picChg>
       </pc:sldChg>
       <pc:sldChg chg="del">
         <pc:chgData name="Maria Bueno Alvez" userId="f93260c4-fd88-4e6f-a65f-5c9220daa250" providerId="ADAL" clId="{7B4DC07F-E7C2-5C5D-BC7C-305545810802}" dt="2025-09-15T09:51:11.368" v="32" actId="2696"/>
@@ -422,27 +428,27 @@
         </pc:sldMkLst>
       </pc:sldChg>
       <pc:sldChg chg="addSp delSp modSp add mod">
-        <pc:chgData name="Maria Bueno Alvez" userId="f93260c4-fd88-4e6f-a65f-5c9220daa250" providerId="ADAL" clId="{7B4DC07F-E7C2-5C5D-BC7C-305545810802}" dt="2025-09-15T10:41:56.606" v="248" actId="21"/>
+        <pc:chgData name="Maria Bueno Alvez" userId="f93260c4-fd88-4e6f-a65f-5c9220daa250" providerId="ADAL" clId="{7B4DC07F-E7C2-5C5D-BC7C-305545810802}" dt="2025-09-18T08:21:21.790" v="393" actId="20577"/>
         <pc:sldMkLst>
           <pc:docMk/>
           <pc:sldMk cId="3927483690" sldId="2038389239"/>
         </pc:sldMkLst>
         <pc:spChg chg="mod">
-          <ac:chgData name="Maria Bueno Alvez" userId="f93260c4-fd88-4e6f-a65f-5c9220daa250" providerId="ADAL" clId="{7B4DC07F-E7C2-5C5D-BC7C-305545810802}" dt="2025-09-15T09:51:45.228" v="104" actId="20577"/>
+          <ac:chgData name="Maria Bueno Alvez" userId="f93260c4-fd88-4e6f-a65f-5c9220daa250" providerId="ADAL" clId="{7B4DC07F-E7C2-5C5D-BC7C-305545810802}" dt="2025-09-18T08:21:21.790" v="393" actId="20577"/>
           <ac:spMkLst>
             <pc:docMk/>
             <pc:sldMk cId="3927483690" sldId="2038389239"/>
             <ac:spMk id="2" creationId="{C949105D-862E-1B47-95BE-D4CA6BCED600}"/>
           </ac:spMkLst>
         </pc:spChg>
-        <pc:spChg chg="add del mod">
-          <ac:chgData name="Maria Bueno Alvez" userId="f93260c4-fd88-4e6f-a65f-5c9220daa250" providerId="ADAL" clId="{7B4DC07F-E7C2-5C5D-BC7C-305545810802}" dt="2025-09-15T10:41:56.606" v="248" actId="21"/>
-          <ac:spMkLst>
+        <pc:picChg chg="add mod">
+          <ac:chgData name="Maria Bueno Alvez" userId="f93260c4-fd88-4e6f-a65f-5c9220daa250" providerId="ADAL" clId="{7B4DC07F-E7C2-5C5D-BC7C-305545810802}" dt="2025-09-18T08:21:12.838" v="381" actId="1076"/>
+          <ac:picMkLst>
             <pc:docMk/>
             <pc:sldMk cId="3927483690" sldId="2038389239"/>
-            <ac:spMk id="3" creationId="{78BF2308-2AE4-20DC-7143-EE19BEB80887}"/>
-          </ac:spMkLst>
-        </pc:spChg>
+            <ac:picMk id="4" creationId="{EFDF38A1-2E58-9186-2B70-C417AB9EDABC}"/>
+          </ac:picMkLst>
+        </pc:picChg>
       </pc:sldChg>
       <pc:sldChg chg="modSp add mod">
         <pc:chgData name="Maria Bueno Alvez" userId="f93260c4-fd88-4e6f-a65f-5c9220daa250" providerId="ADAL" clId="{7B4DC07F-E7C2-5C5D-BC7C-305545810802}" dt="2025-09-15T09:51:55.796" v="124" actId="20577"/>
@@ -562,11 +568,63 @@
           <pc:sldMk cId="808089514" sldId="2038389246"/>
         </pc:sldMkLst>
       </pc:sldChg>
+      <pc:sldChg chg="delSp modSp add mod">
+        <pc:chgData name="Maria Bueno Alvez" userId="f93260c4-fd88-4e6f-a65f-5c9220daa250" providerId="ADAL" clId="{7B4DC07F-E7C2-5C5D-BC7C-305545810802}" dt="2025-09-18T06:52:08.544" v="330" actId="478"/>
+        <pc:sldMkLst>
+          <pc:docMk/>
+          <pc:sldMk cId="1984819609" sldId="2038389246"/>
+        </pc:sldMkLst>
+        <pc:spChg chg="mod">
+          <ac:chgData name="Maria Bueno Alvez" userId="f93260c4-fd88-4e6f-a65f-5c9220daa250" providerId="ADAL" clId="{7B4DC07F-E7C2-5C5D-BC7C-305545810802}" dt="2025-09-18T06:52:06.328" v="329" actId="20577"/>
+          <ac:spMkLst>
+            <pc:docMk/>
+            <pc:sldMk cId="1984819609" sldId="2038389246"/>
+            <ac:spMk id="2" creationId="{B1A66981-8E2D-39AE-99A8-552B00251ADA}"/>
+          </ac:spMkLst>
+        </pc:spChg>
+        <pc:picChg chg="del">
+          <ac:chgData name="Maria Bueno Alvez" userId="f93260c4-fd88-4e6f-a65f-5c9220daa250" providerId="ADAL" clId="{7B4DC07F-E7C2-5C5D-BC7C-305545810802}" dt="2025-09-18T06:52:08.544" v="330" actId="478"/>
+          <ac:picMkLst>
+            <pc:docMk/>
+            <pc:sldMk cId="1984819609" sldId="2038389246"/>
+            <ac:picMk id="4" creationId="{D84853E9-AE70-3423-D357-C763AB42D342}"/>
+          </ac:picMkLst>
+        </pc:picChg>
+      </pc:sldChg>
       <pc:sldChg chg="del">
         <pc:chgData name="Maria Bueno Alvez" userId="f93260c4-fd88-4e6f-a65f-5c9220daa250" providerId="ADAL" clId="{7B4DC07F-E7C2-5C5D-BC7C-305545810802}" dt="2025-09-15T09:51:08.636" v="8" actId="2696"/>
         <pc:sldMkLst>
           <pc:docMk/>
           <pc:sldMk cId="1964055846" sldId="2038389247"/>
+        </pc:sldMkLst>
+      </pc:sldChg>
+      <pc:sldChg chg="modSp add mod">
+        <pc:chgData name="Maria Bueno Alvez" userId="f93260c4-fd88-4e6f-a65f-5c9220daa250" providerId="ADAL" clId="{7B4DC07F-E7C2-5C5D-BC7C-305545810802}" dt="2025-09-18T06:52:16.861" v="351" actId="20577"/>
+        <pc:sldMkLst>
+          <pc:docMk/>
+          <pc:sldMk cId="3424386674" sldId="2038389247"/>
+        </pc:sldMkLst>
+        <pc:spChg chg="mod">
+          <ac:chgData name="Maria Bueno Alvez" userId="f93260c4-fd88-4e6f-a65f-5c9220daa250" providerId="ADAL" clId="{7B4DC07F-E7C2-5C5D-BC7C-305545810802}" dt="2025-09-18T06:52:16.861" v="351" actId="20577"/>
+          <ac:spMkLst>
+            <pc:docMk/>
+            <pc:sldMk cId="3424386674" sldId="2038389247"/>
+            <ac:spMk id="2" creationId="{C145D9CD-C06C-366B-18C7-B3ED8ABD5B17}"/>
+          </ac:spMkLst>
+        </pc:spChg>
+      </pc:sldChg>
+      <pc:sldChg chg="add">
+        <pc:chgData name="Maria Bueno Alvez" userId="f93260c4-fd88-4e6f-a65f-5c9220daa250" providerId="ADAL" clId="{7B4DC07F-E7C2-5C5D-BC7C-305545810802}" dt="2025-09-18T07:11:54.143" v="352"/>
+        <pc:sldMkLst>
+          <pc:docMk/>
+          <pc:sldMk cId="2028564394" sldId="2038389248"/>
+        </pc:sldMkLst>
+      </pc:sldChg>
+      <pc:sldChg chg="add">
+        <pc:chgData name="Maria Bueno Alvez" userId="f93260c4-fd88-4e6f-a65f-5c9220daa250" providerId="ADAL" clId="{7B4DC07F-E7C2-5C5D-BC7C-305545810802}" dt="2025-09-18T08:20:19.931" v="369"/>
+        <pc:sldMkLst>
+          <pc:docMk/>
+          <pc:sldMk cId="2335048821" sldId="2038389249"/>
         </pc:sldMkLst>
       </pc:sldChg>
       <pc:sldChg chg="del">
@@ -582,6 +640,36 @@
           <pc:docMk/>
           <pc:sldMk cId="907794562" sldId="2038389250"/>
         </pc:sldMkLst>
+      </pc:sldChg>
+      <pc:sldChg chg="modSp add mod">
+        <pc:chgData name="Maria Bueno Alvez" userId="f93260c4-fd88-4e6f-a65f-5c9220daa250" providerId="ADAL" clId="{7B4DC07F-E7C2-5C5D-BC7C-305545810802}" dt="2025-09-18T08:21:28.605" v="405" actId="20577"/>
+        <pc:sldMkLst>
+          <pc:docMk/>
+          <pc:sldMk cId="3041482597" sldId="2038389250"/>
+        </pc:sldMkLst>
+        <pc:spChg chg="mod">
+          <ac:chgData name="Maria Bueno Alvez" userId="f93260c4-fd88-4e6f-a65f-5c9220daa250" providerId="ADAL" clId="{7B4DC07F-E7C2-5C5D-BC7C-305545810802}" dt="2025-09-18T08:21:28.605" v="405" actId="20577"/>
+          <ac:spMkLst>
+            <pc:docMk/>
+            <pc:sldMk cId="3041482597" sldId="2038389250"/>
+            <ac:spMk id="2" creationId="{05AC896B-B1F7-5DC6-4147-9C038486EF56}"/>
+          </ac:spMkLst>
+        </pc:spChg>
+      </pc:sldChg>
+      <pc:sldChg chg="modSp add mod">
+        <pc:chgData name="Maria Bueno Alvez" userId="f93260c4-fd88-4e6f-a65f-5c9220daa250" providerId="ADAL" clId="{7B4DC07F-E7C2-5C5D-BC7C-305545810802}" dt="2025-09-18T08:21:36.411" v="416" actId="20577"/>
+        <pc:sldMkLst>
+          <pc:docMk/>
+          <pc:sldMk cId="4193673010" sldId="2038389251"/>
+        </pc:sldMkLst>
+        <pc:spChg chg="mod">
+          <ac:chgData name="Maria Bueno Alvez" userId="f93260c4-fd88-4e6f-a65f-5c9220daa250" providerId="ADAL" clId="{7B4DC07F-E7C2-5C5D-BC7C-305545810802}" dt="2025-09-18T08:21:36.411" v="416" actId="20577"/>
+          <ac:spMkLst>
+            <pc:docMk/>
+            <pc:sldMk cId="4193673010" sldId="2038389251"/>
+            <ac:spMk id="2" creationId="{C31077F8-0FAF-3D73-6218-F2DC89ECB77C}"/>
+          </ac:spMkLst>
+        </pc:spChg>
       </pc:sldChg>
     </pc:docChg>
   </pc:docChgLst>
@@ -670,7 +758,7 @@
           <a:p>
             <a:fld id="{6BAF2402-AB92-914B-81A2-8D83FF11F360}" type="datetimeFigureOut">
               <a:rPr lang="en-SE" smtClean="0"/>
-              <a:t>2025-09-15</a:t>
+              <a:t>2025-09-18</a:t>
             </a:fld>
             <a:endParaRPr lang="en-SE"/>
           </a:p>
@@ -1090,7 +1178,7 @@
 </p:notes>
 </file>
 
-<file path=ppt/notesSlides/notesSlide2.xml><?xml version="1.0" encoding="utf-8"?>
+<file path=ppt/notesSlides/notesSlide10.xml><?xml version="1.0" encoding="utf-8"?>
 <p:notes xmlns:a="http://schemas.openxmlformats.org/drawingml/2006/main" xmlns:r="http://schemas.openxmlformats.org/officeDocument/2006/relationships" xmlns:p="http://schemas.openxmlformats.org/presentationml/2006/main">
   <p:cSld>
     <p:spTree>
@@ -1098,7 +1186,7 @@
         <p:cNvPr id="1" name="">
           <a:extLst>
             <a:ext uri="{FF2B5EF4-FFF2-40B4-BE49-F238E27FC236}">
-              <a16:creationId xmlns:a16="http://schemas.microsoft.com/office/drawing/2014/main" id="{610BE557-55C5-7D40-3BB0-C5F0D691570E}"/>
+              <a16:creationId xmlns:a16="http://schemas.microsoft.com/office/drawing/2014/main" id="{5970C9EF-185A-383A-F130-A0272FD0AEF9}"/>
             </a:ext>
           </a:extLst>
         </p:cNvPr>
@@ -1118,7 +1206,7 @@
           <p:cNvPr id="2" name="Slide Image Placeholder 1">
             <a:extLst>
               <a:ext uri="{FF2B5EF4-FFF2-40B4-BE49-F238E27FC236}">
-                <a16:creationId xmlns:a16="http://schemas.microsoft.com/office/drawing/2014/main" id="{285EDAB2-1F12-5585-1512-FB1D7009517A}"/>
+                <a16:creationId xmlns:a16="http://schemas.microsoft.com/office/drawing/2014/main" id="{7E412595-1DC0-7CDE-1EFC-5611D12A8772}"/>
               </a:ext>
             </a:extLst>
           </p:cNvPr>
@@ -1136,7 +1224,7 @@
           <p:cNvPr id="3" name="Notes Placeholder 2">
             <a:extLst>
               <a:ext uri="{FF2B5EF4-FFF2-40B4-BE49-F238E27FC236}">
-                <a16:creationId xmlns:a16="http://schemas.microsoft.com/office/drawing/2014/main" id="{82E505C9-D1D3-A6F5-D930-9C35AB0487EB}"/>
+                <a16:creationId xmlns:a16="http://schemas.microsoft.com/office/drawing/2014/main" id="{BB5DD665-2887-B8D9-B5C6-D0A71F3F20B0}"/>
               </a:ext>
             </a:extLst>
           </p:cNvPr>
@@ -1169,7 +1257,643 @@
           <p:cNvPr id="4" name="Slide Number Placeholder 3">
             <a:extLst>
               <a:ext uri="{FF2B5EF4-FFF2-40B4-BE49-F238E27FC236}">
-                <a16:creationId xmlns:a16="http://schemas.microsoft.com/office/drawing/2014/main" id="{C603E5AA-EE2A-A8D1-9B43-4074125CD2A3}"/>
+                <a16:creationId xmlns:a16="http://schemas.microsoft.com/office/drawing/2014/main" id="{F08C123D-B5A2-2C15-0859-DA29E4827E29}"/>
+              </a:ext>
+            </a:extLst>
+          </p:cNvPr>
+          <p:cNvSpPr>
+            <a:spLocks noGrp="1"/>
+          </p:cNvSpPr>
+          <p:nvPr>
+            <p:ph type="sldNum" sz="quarter" idx="5"/>
+          </p:nvPr>
+        </p:nvSpPr>
+        <p:spPr/>
+        <p:txBody>
+          <a:bodyPr/>
+          <a:lstStyle/>
+          <a:p>
+            <a:pPr marL="0" marR="0" lvl="0" indent="0" algn="r" defTabSz="914400" rtl="0" eaLnBrk="1" fontAlgn="auto" latinLnBrk="0" hangingPunct="1">
+              <a:lnSpc>
+                <a:spcPct val="100000"/>
+              </a:lnSpc>
+              <a:spcBef>
+                <a:spcPts val="0"/>
+              </a:spcBef>
+              <a:spcAft>
+                <a:spcPts val="0"/>
+              </a:spcAft>
+              <a:buClrTx/>
+              <a:buSzTx/>
+              <a:buFontTx/>
+              <a:buNone/>
+              <a:tabLst/>
+              <a:defRPr/>
+            </a:pPr>
+            <a:fld id="{EEFC255A-7693-4C43-B4AC-8A4920D60E3E}" type="slidenum">
+              <a:rPr kumimoji="0" lang="en-US" sz="1200" b="0" i="0" u="none" strike="noStrike" kern="1200" cap="none" spc="0" normalizeH="0" baseline="0" noProof="0" smtClean="0">
+                <a:ln>
+                  <a:noFill/>
+                </a:ln>
+                <a:solidFill>
+                  <a:prstClr val="black"/>
+                </a:solidFill>
+                <a:effectLst/>
+                <a:uLnTx/>
+                <a:uFillTx/>
+                <a:latin typeface="Calibri" panose="020F0502020204030204"/>
+                <a:ea typeface="+mn-ea"/>
+                <a:cs typeface="+mn-cs"/>
+              </a:rPr>
+              <a:pPr marL="0" marR="0" lvl="0" indent="0" algn="r" defTabSz="914400" rtl="0" eaLnBrk="1" fontAlgn="auto" latinLnBrk="0" hangingPunct="1">
+                <a:lnSpc>
+                  <a:spcPct val="100000"/>
+                </a:lnSpc>
+                <a:spcBef>
+                  <a:spcPts val="0"/>
+                </a:spcBef>
+                <a:spcAft>
+                  <a:spcPts val="0"/>
+                </a:spcAft>
+                <a:buClrTx/>
+                <a:buSzTx/>
+                <a:buFontTx/>
+                <a:buNone/>
+                <a:tabLst/>
+                <a:defRPr/>
+              </a:pPr>
+              <a:t>12</a:t>
+            </a:fld>
+            <a:endParaRPr kumimoji="0" lang="en-US" sz="1200" b="0" i="0" u="none" strike="noStrike" kern="1200" cap="none" spc="0" normalizeH="0" baseline="0" noProof="0">
+              <a:ln>
+                <a:noFill/>
+              </a:ln>
+              <a:solidFill>
+                <a:prstClr val="black"/>
+              </a:solidFill>
+              <a:effectLst/>
+              <a:uLnTx/>
+              <a:uFillTx/>
+              <a:latin typeface="Calibri" panose="020F0502020204030204"/>
+              <a:ea typeface="+mn-ea"/>
+              <a:cs typeface="+mn-cs"/>
+            </a:endParaRPr>
+          </a:p>
+        </p:txBody>
+      </p:sp>
+    </p:spTree>
+    <p:extLst>
+      <p:ext uri="{BB962C8B-B14F-4D97-AF65-F5344CB8AC3E}">
+        <p14:creationId xmlns:p14="http://schemas.microsoft.com/office/powerpoint/2010/main" val="62980263"/>
+      </p:ext>
+    </p:extLst>
+  </p:cSld>
+  <p:clrMapOvr>
+    <a:masterClrMapping/>
+  </p:clrMapOvr>
+</p:notes>
+</file>
+
+<file path=ppt/notesSlides/notesSlide11.xml><?xml version="1.0" encoding="utf-8"?>
+<p:notes xmlns:a="http://schemas.openxmlformats.org/drawingml/2006/main" xmlns:r="http://schemas.openxmlformats.org/officeDocument/2006/relationships" xmlns:p="http://schemas.openxmlformats.org/presentationml/2006/main">
+  <p:cSld>
+    <p:spTree>
+      <p:nvGrpSpPr>
+        <p:cNvPr id="1" name="">
+          <a:extLst>
+            <a:ext uri="{FF2B5EF4-FFF2-40B4-BE49-F238E27FC236}">
+              <a16:creationId xmlns:a16="http://schemas.microsoft.com/office/drawing/2014/main" id="{4ED5F394-F335-0F9C-BD82-0DFA08D8EE9D}"/>
+            </a:ext>
+          </a:extLst>
+        </p:cNvPr>
+        <p:cNvGrpSpPr/>
+        <p:nvPr/>
+      </p:nvGrpSpPr>
+      <p:grpSpPr>
+        <a:xfrm>
+          <a:off x="0" y="0"/>
+          <a:ext cx="0" cy="0"/>
+          <a:chOff x="0" y="0"/>
+          <a:chExt cx="0" cy="0"/>
+        </a:xfrm>
+      </p:grpSpPr>
+      <p:sp>
+        <p:nvSpPr>
+          <p:cNvPr id="2" name="Slide Image Placeholder 1">
+            <a:extLst>
+              <a:ext uri="{FF2B5EF4-FFF2-40B4-BE49-F238E27FC236}">
+                <a16:creationId xmlns:a16="http://schemas.microsoft.com/office/drawing/2014/main" id="{638468C3-A7A0-E971-9EA1-B390EF040424}"/>
+              </a:ext>
+            </a:extLst>
+          </p:cNvPr>
+          <p:cNvSpPr>
+            <a:spLocks noGrp="1" noRot="1" noChangeAspect="1"/>
+          </p:cNvSpPr>
+          <p:nvPr>
+            <p:ph type="sldImg"/>
+          </p:nvPr>
+        </p:nvSpPr>
+        <p:spPr/>
+      </p:sp>
+      <p:sp>
+        <p:nvSpPr>
+          <p:cNvPr id="3" name="Notes Placeholder 2">
+            <a:extLst>
+              <a:ext uri="{FF2B5EF4-FFF2-40B4-BE49-F238E27FC236}">
+                <a16:creationId xmlns:a16="http://schemas.microsoft.com/office/drawing/2014/main" id="{528F6600-9EE0-E4DD-C569-F574730B171F}"/>
+              </a:ext>
+            </a:extLst>
+          </p:cNvPr>
+          <p:cNvSpPr>
+            <a:spLocks noGrp="1"/>
+          </p:cNvSpPr>
+          <p:nvPr>
+            <p:ph type="body" idx="1"/>
+          </p:nvPr>
+        </p:nvSpPr>
+        <p:spPr/>
+        <p:txBody>
+          <a:bodyPr/>
+          <a:lstStyle/>
+          <a:p>
+            <a:pPr lvl="1"/>
+            <a:endParaRPr lang="en-US">
+              <a:solidFill>
+                <a:srgbClr val="077FC7"/>
+              </a:solidFill>
+            </a:endParaRPr>
+          </a:p>
+          <a:p>
+            <a:endParaRPr lang="en-US"/>
+          </a:p>
+        </p:txBody>
+      </p:sp>
+      <p:sp>
+        <p:nvSpPr>
+          <p:cNvPr id="4" name="Slide Number Placeholder 3">
+            <a:extLst>
+              <a:ext uri="{FF2B5EF4-FFF2-40B4-BE49-F238E27FC236}">
+                <a16:creationId xmlns:a16="http://schemas.microsoft.com/office/drawing/2014/main" id="{E7B7028D-6496-AA3E-48BF-E5F177D9F45A}"/>
+              </a:ext>
+            </a:extLst>
+          </p:cNvPr>
+          <p:cNvSpPr>
+            <a:spLocks noGrp="1"/>
+          </p:cNvSpPr>
+          <p:nvPr>
+            <p:ph type="sldNum" sz="quarter" idx="5"/>
+          </p:nvPr>
+        </p:nvSpPr>
+        <p:spPr/>
+        <p:txBody>
+          <a:bodyPr/>
+          <a:lstStyle/>
+          <a:p>
+            <a:pPr marL="0" marR="0" lvl="0" indent="0" algn="r" defTabSz="914400" rtl="0" eaLnBrk="1" fontAlgn="auto" latinLnBrk="0" hangingPunct="1">
+              <a:lnSpc>
+                <a:spcPct val="100000"/>
+              </a:lnSpc>
+              <a:spcBef>
+                <a:spcPts val="0"/>
+              </a:spcBef>
+              <a:spcAft>
+                <a:spcPts val="0"/>
+              </a:spcAft>
+              <a:buClrTx/>
+              <a:buSzTx/>
+              <a:buFontTx/>
+              <a:buNone/>
+              <a:tabLst/>
+              <a:defRPr/>
+            </a:pPr>
+            <a:fld id="{EEFC255A-7693-4C43-B4AC-8A4920D60E3E}" type="slidenum">
+              <a:rPr kumimoji="0" lang="en-US" sz="1200" b="0" i="0" u="none" strike="noStrike" kern="1200" cap="none" spc="0" normalizeH="0" baseline="0" noProof="0" smtClean="0">
+                <a:ln>
+                  <a:noFill/>
+                </a:ln>
+                <a:solidFill>
+                  <a:prstClr val="black"/>
+                </a:solidFill>
+                <a:effectLst/>
+                <a:uLnTx/>
+                <a:uFillTx/>
+                <a:latin typeface="Calibri" panose="020F0502020204030204"/>
+                <a:ea typeface="+mn-ea"/>
+                <a:cs typeface="+mn-cs"/>
+              </a:rPr>
+              <a:pPr marL="0" marR="0" lvl="0" indent="0" algn="r" defTabSz="914400" rtl="0" eaLnBrk="1" fontAlgn="auto" latinLnBrk="0" hangingPunct="1">
+                <a:lnSpc>
+                  <a:spcPct val="100000"/>
+                </a:lnSpc>
+                <a:spcBef>
+                  <a:spcPts val="0"/>
+                </a:spcBef>
+                <a:spcAft>
+                  <a:spcPts val="0"/>
+                </a:spcAft>
+                <a:buClrTx/>
+                <a:buSzTx/>
+                <a:buFontTx/>
+                <a:buNone/>
+                <a:tabLst/>
+                <a:defRPr/>
+              </a:pPr>
+              <a:t>13</a:t>
+            </a:fld>
+            <a:endParaRPr kumimoji="0" lang="en-US" sz="1200" b="0" i="0" u="none" strike="noStrike" kern="1200" cap="none" spc="0" normalizeH="0" baseline="0" noProof="0">
+              <a:ln>
+                <a:noFill/>
+              </a:ln>
+              <a:solidFill>
+                <a:prstClr val="black"/>
+              </a:solidFill>
+              <a:effectLst/>
+              <a:uLnTx/>
+              <a:uFillTx/>
+              <a:latin typeface="Calibri" panose="020F0502020204030204"/>
+              <a:ea typeface="+mn-ea"/>
+              <a:cs typeface="+mn-cs"/>
+            </a:endParaRPr>
+          </a:p>
+        </p:txBody>
+      </p:sp>
+    </p:spTree>
+    <p:extLst>
+      <p:ext uri="{BB962C8B-B14F-4D97-AF65-F5344CB8AC3E}">
+        <p14:creationId xmlns:p14="http://schemas.microsoft.com/office/powerpoint/2010/main" val="3492822132"/>
+      </p:ext>
+    </p:extLst>
+  </p:cSld>
+  <p:clrMapOvr>
+    <a:masterClrMapping/>
+  </p:clrMapOvr>
+</p:notes>
+</file>
+
+<file path=ppt/notesSlides/notesSlide12.xml><?xml version="1.0" encoding="utf-8"?>
+<p:notes xmlns:a="http://schemas.openxmlformats.org/drawingml/2006/main" xmlns:r="http://schemas.openxmlformats.org/officeDocument/2006/relationships" xmlns:p="http://schemas.openxmlformats.org/presentationml/2006/main">
+  <p:cSld>
+    <p:spTree>
+      <p:nvGrpSpPr>
+        <p:cNvPr id="1" name="">
+          <a:extLst>
+            <a:ext uri="{FF2B5EF4-FFF2-40B4-BE49-F238E27FC236}">
+              <a16:creationId xmlns:a16="http://schemas.microsoft.com/office/drawing/2014/main" id="{FB80D371-165C-F1DC-3818-8AFEA58F897A}"/>
+            </a:ext>
+          </a:extLst>
+        </p:cNvPr>
+        <p:cNvGrpSpPr/>
+        <p:nvPr/>
+      </p:nvGrpSpPr>
+      <p:grpSpPr>
+        <a:xfrm>
+          <a:off x="0" y="0"/>
+          <a:ext cx="0" cy="0"/>
+          <a:chOff x="0" y="0"/>
+          <a:chExt cx="0" cy="0"/>
+        </a:xfrm>
+      </p:grpSpPr>
+      <p:sp>
+        <p:nvSpPr>
+          <p:cNvPr id="2" name="Slide Image Placeholder 1">
+            <a:extLst>
+              <a:ext uri="{FF2B5EF4-FFF2-40B4-BE49-F238E27FC236}">
+                <a16:creationId xmlns:a16="http://schemas.microsoft.com/office/drawing/2014/main" id="{0B747E98-87A1-630A-9342-54722B3AC496}"/>
+              </a:ext>
+            </a:extLst>
+          </p:cNvPr>
+          <p:cNvSpPr>
+            <a:spLocks noGrp="1" noRot="1" noChangeAspect="1"/>
+          </p:cNvSpPr>
+          <p:nvPr>
+            <p:ph type="sldImg"/>
+          </p:nvPr>
+        </p:nvSpPr>
+        <p:spPr/>
+      </p:sp>
+      <p:sp>
+        <p:nvSpPr>
+          <p:cNvPr id="3" name="Notes Placeholder 2">
+            <a:extLst>
+              <a:ext uri="{FF2B5EF4-FFF2-40B4-BE49-F238E27FC236}">
+                <a16:creationId xmlns:a16="http://schemas.microsoft.com/office/drawing/2014/main" id="{E211F158-51F3-B786-3D6D-93A3180AEDBD}"/>
+              </a:ext>
+            </a:extLst>
+          </p:cNvPr>
+          <p:cNvSpPr>
+            <a:spLocks noGrp="1"/>
+          </p:cNvSpPr>
+          <p:nvPr>
+            <p:ph type="body" idx="1"/>
+          </p:nvPr>
+        </p:nvSpPr>
+        <p:spPr/>
+        <p:txBody>
+          <a:bodyPr/>
+          <a:lstStyle/>
+          <a:p>
+            <a:pPr lvl="1"/>
+            <a:endParaRPr lang="en-US">
+              <a:solidFill>
+                <a:srgbClr val="077FC7"/>
+              </a:solidFill>
+            </a:endParaRPr>
+          </a:p>
+          <a:p>
+            <a:endParaRPr lang="en-US"/>
+          </a:p>
+        </p:txBody>
+      </p:sp>
+      <p:sp>
+        <p:nvSpPr>
+          <p:cNvPr id="4" name="Slide Number Placeholder 3">
+            <a:extLst>
+              <a:ext uri="{FF2B5EF4-FFF2-40B4-BE49-F238E27FC236}">
+                <a16:creationId xmlns:a16="http://schemas.microsoft.com/office/drawing/2014/main" id="{E307D5FB-09BE-4C18-A701-73A27059BE9B}"/>
+              </a:ext>
+            </a:extLst>
+          </p:cNvPr>
+          <p:cNvSpPr>
+            <a:spLocks noGrp="1"/>
+          </p:cNvSpPr>
+          <p:nvPr>
+            <p:ph type="sldNum" sz="quarter" idx="5"/>
+          </p:nvPr>
+        </p:nvSpPr>
+        <p:spPr/>
+        <p:txBody>
+          <a:bodyPr/>
+          <a:lstStyle/>
+          <a:p>
+            <a:pPr marL="0" marR="0" lvl="0" indent="0" algn="r" defTabSz="914400" rtl="0" eaLnBrk="1" fontAlgn="auto" latinLnBrk="0" hangingPunct="1">
+              <a:lnSpc>
+                <a:spcPct val="100000"/>
+              </a:lnSpc>
+              <a:spcBef>
+                <a:spcPts val="0"/>
+              </a:spcBef>
+              <a:spcAft>
+                <a:spcPts val="0"/>
+              </a:spcAft>
+              <a:buClrTx/>
+              <a:buSzTx/>
+              <a:buFontTx/>
+              <a:buNone/>
+              <a:tabLst/>
+              <a:defRPr/>
+            </a:pPr>
+            <a:fld id="{EEFC255A-7693-4C43-B4AC-8A4920D60E3E}" type="slidenum">
+              <a:rPr kumimoji="0" lang="en-US" sz="1200" b="0" i="0" u="none" strike="noStrike" kern="1200" cap="none" spc="0" normalizeH="0" baseline="0" noProof="0" smtClean="0">
+                <a:ln>
+                  <a:noFill/>
+                </a:ln>
+                <a:solidFill>
+                  <a:prstClr val="black"/>
+                </a:solidFill>
+                <a:effectLst/>
+                <a:uLnTx/>
+                <a:uFillTx/>
+                <a:latin typeface="Calibri" panose="020F0502020204030204"/>
+                <a:ea typeface="+mn-ea"/>
+                <a:cs typeface="+mn-cs"/>
+              </a:rPr>
+              <a:pPr marL="0" marR="0" lvl="0" indent="0" algn="r" defTabSz="914400" rtl="0" eaLnBrk="1" fontAlgn="auto" latinLnBrk="0" hangingPunct="1">
+                <a:lnSpc>
+                  <a:spcPct val="100000"/>
+                </a:lnSpc>
+                <a:spcBef>
+                  <a:spcPts val="0"/>
+                </a:spcBef>
+                <a:spcAft>
+                  <a:spcPts val="0"/>
+                </a:spcAft>
+                <a:buClrTx/>
+                <a:buSzTx/>
+                <a:buFontTx/>
+                <a:buNone/>
+                <a:tabLst/>
+                <a:defRPr/>
+              </a:pPr>
+              <a:t>15</a:t>
+            </a:fld>
+            <a:endParaRPr kumimoji="0" lang="en-US" sz="1200" b="0" i="0" u="none" strike="noStrike" kern="1200" cap="none" spc="0" normalizeH="0" baseline="0" noProof="0">
+              <a:ln>
+                <a:noFill/>
+              </a:ln>
+              <a:solidFill>
+                <a:prstClr val="black"/>
+              </a:solidFill>
+              <a:effectLst/>
+              <a:uLnTx/>
+              <a:uFillTx/>
+              <a:latin typeface="Calibri" panose="020F0502020204030204"/>
+              <a:ea typeface="+mn-ea"/>
+              <a:cs typeface="+mn-cs"/>
+            </a:endParaRPr>
+          </a:p>
+        </p:txBody>
+      </p:sp>
+    </p:spTree>
+    <p:extLst>
+      <p:ext uri="{BB962C8B-B14F-4D97-AF65-F5344CB8AC3E}">
+        <p14:creationId xmlns:p14="http://schemas.microsoft.com/office/powerpoint/2010/main" val="3869591512"/>
+      </p:ext>
+    </p:extLst>
+  </p:cSld>
+  <p:clrMapOvr>
+    <a:masterClrMapping/>
+  </p:clrMapOvr>
+</p:notes>
+</file>
+
+<file path=ppt/notesSlides/notesSlide13.xml><?xml version="1.0" encoding="utf-8"?>
+<p:notes xmlns:a="http://schemas.openxmlformats.org/drawingml/2006/main" xmlns:r="http://schemas.openxmlformats.org/officeDocument/2006/relationships" xmlns:p="http://schemas.openxmlformats.org/presentationml/2006/main">
+  <p:cSld>
+    <p:spTree>
+      <p:nvGrpSpPr>
+        <p:cNvPr id="1" name="">
+          <a:extLst>
+            <a:ext uri="{FF2B5EF4-FFF2-40B4-BE49-F238E27FC236}">
+              <a16:creationId xmlns:a16="http://schemas.microsoft.com/office/drawing/2014/main" id="{6451D497-76B0-0006-4B9B-6BFBF245F958}"/>
+            </a:ext>
+          </a:extLst>
+        </p:cNvPr>
+        <p:cNvGrpSpPr/>
+        <p:nvPr/>
+      </p:nvGrpSpPr>
+      <p:grpSpPr>
+        <a:xfrm>
+          <a:off x="0" y="0"/>
+          <a:ext cx="0" cy="0"/>
+          <a:chOff x="0" y="0"/>
+          <a:chExt cx="0" cy="0"/>
+        </a:xfrm>
+      </p:grpSpPr>
+      <p:sp>
+        <p:nvSpPr>
+          <p:cNvPr id="2" name="Slide Image Placeholder 1">
+            <a:extLst>
+              <a:ext uri="{FF2B5EF4-FFF2-40B4-BE49-F238E27FC236}">
+                <a16:creationId xmlns:a16="http://schemas.microsoft.com/office/drawing/2014/main" id="{3DD3A122-66C4-B761-C338-21E7D952CDC2}"/>
+              </a:ext>
+            </a:extLst>
+          </p:cNvPr>
+          <p:cNvSpPr>
+            <a:spLocks noGrp="1" noRot="1" noChangeAspect="1"/>
+          </p:cNvSpPr>
+          <p:nvPr>
+            <p:ph type="sldImg"/>
+          </p:nvPr>
+        </p:nvSpPr>
+        <p:spPr/>
+      </p:sp>
+      <p:sp>
+        <p:nvSpPr>
+          <p:cNvPr id="3" name="Notes Placeholder 2">
+            <a:extLst>
+              <a:ext uri="{FF2B5EF4-FFF2-40B4-BE49-F238E27FC236}">
+                <a16:creationId xmlns:a16="http://schemas.microsoft.com/office/drawing/2014/main" id="{BCD52DE6-1164-E575-EBF3-623F16A7BE77}"/>
+              </a:ext>
+            </a:extLst>
+          </p:cNvPr>
+          <p:cNvSpPr>
+            <a:spLocks noGrp="1"/>
+          </p:cNvSpPr>
+          <p:nvPr>
+            <p:ph type="body" idx="1"/>
+          </p:nvPr>
+        </p:nvSpPr>
+        <p:spPr/>
+        <p:txBody>
+          <a:bodyPr/>
+          <a:lstStyle/>
+          <a:p>
+            <a:endParaRPr lang="sv-SE" dirty="0"/>
+          </a:p>
+        </p:txBody>
+      </p:sp>
+      <p:sp>
+        <p:nvSpPr>
+          <p:cNvPr id="4" name="Slide Number Placeholder 3">
+            <a:extLst>
+              <a:ext uri="{FF2B5EF4-FFF2-40B4-BE49-F238E27FC236}">
+                <a16:creationId xmlns:a16="http://schemas.microsoft.com/office/drawing/2014/main" id="{CEC50C64-DEE7-F893-F24F-EB7D03342DAF}"/>
+              </a:ext>
+            </a:extLst>
+          </p:cNvPr>
+          <p:cNvSpPr>
+            <a:spLocks noGrp="1"/>
+          </p:cNvSpPr>
+          <p:nvPr>
+            <p:ph type="sldNum" sz="quarter" idx="5"/>
+          </p:nvPr>
+        </p:nvSpPr>
+        <p:spPr/>
+        <p:txBody>
+          <a:bodyPr/>
+          <a:lstStyle/>
+          <a:p>
+            <a:fld id="{C856C2C0-8A41-D540-A192-012301397A6B}" type="slidenum">
+              <a:rPr lang="en-US" smtClean="0"/>
+              <a:t>17</a:t>
+            </a:fld>
+            <a:endParaRPr lang="en-US"/>
+          </a:p>
+        </p:txBody>
+      </p:sp>
+    </p:spTree>
+    <p:extLst>
+      <p:ext uri="{BB962C8B-B14F-4D97-AF65-F5344CB8AC3E}">
+        <p14:creationId xmlns:p14="http://schemas.microsoft.com/office/powerpoint/2010/main" val="3208872060"/>
+      </p:ext>
+    </p:extLst>
+  </p:cSld>
+  <p:clrMapOvr>
+    <a:masterClrMapping/>
+  </p:clrMapOvr>
+</p:notes>
+</file>
+
+<file path=ppt/notesSlides/notesSlide2.xml><?xml version="1.0" encoding="utf-8"?>
+<p:notes xmlns:a="http://schemas.openxmlformats.org/drawingml/2006/main" xmlns:r="http://schemas.openxmlformats.org/officeDocument/2006/relationships" xmlns:p="http://schemas.openxmlformats.org/presentationml/2006/main">
+  <p:cSld>
+    <p:spTree>
+      <p:nvGrpSpPr>
+        <p:cNvPr id="1" name="">
+          <a:extLst>
+            <a:ext uri="{FF2B5EF4-FFF2-40B4-BE49-F238E27FC236}">
+              <a16:creationId xmlns:a16="http://schemas.microsoft.com/office/drawing/2014/main" id="{886CA0B5-0C1E-F856-9BA2-8AB22E4E8316}"/>
+            </a:ext>
+          </a:extLst>
+        </p:cNvPr>
+        <p:cNvGrpSpPr/>
+        <p:nvPr/>
+      </p:nvGrpSpPr>
+      <p:grpSpPr>
+        <a:xfrm>
+          <a:off x="0" y="0"/>
+          <a:ext cx="0" cy="0"/>
+          <a:chOff x="0" y="0"/>
+          <a:chExt cx="0" cy="0"/>
+        </a:xfrm>
+      </p:grpSpPr>
+      <p:sp>
+        <p:nvSpPr>
+          <p:cNvPr id="2" name="Slide Image Placeholder 1">
+            <a:extLst>
+              <a:ext uri="{FF2B5EF4-FFF2-40B4-BE49-F238E27FC236}">
+                <a16:creationId xmlns:a16="http://schemas.microsoft.com/office/drawing/2014/main" id="{9ABC6BE9-62D6-96B2-BC81-689804E0523C}"/>
+              </a:ext>
+            </a:extLst>
+          </p:cNvPr>
+          <p:cNvSpPr>
+            <a:spLocks noGrp="1" noRot="1" noChangeAspect="1"/>
+          </p:cNvSpPr>
+          <p:nvPr>
+            <p:ph type="sldImg"/>
+          </p:nvPr>
+        </p:nvSpPr>
+        <p:spPr/>
+      </p:sp>
+      <p:sp>
+        <p:nvSpPr>
+          <p:cNvPr id="3" name="Notes Placeholder 2">
+            <a:extLst>
+              <a:ext uri="{FF2B5EF4-FFF2-40B4-BE49-F238E27FC236}">
+                <a16:creationId xmlns:a16="http://schemas.microsoft.com/office/drawing/2014/main" id="{49DE79EC-7804-F742-401E-4D4D02877C48}"/>
+              </a:ext>
+            </a:extLst>
+          </p:cNvPr>
+          <p:cNvSpPr>
+            <a:spLocks noGrp="1"/>
+          </p:cNvSpPr>
+          <p:nvPr>
+            <p:ph type="body" idx="1"/>
+          </p:nvPr>
+        </p:nvSpPr>
+        <p:spPr/>
+        <p:txBody>
+          <a:bodyPr/>
+          <a:lstStyle/>
+          <a:p>
+            <a:pPr lvl="1"/>
+            <a:endParaRPr lang="en-US">
+              <a:solidFill>
+                <a:srgbClr val="077FC7"/>
+              </a:solidFill>
+            </a:endParaRPr>
+          </a:p>
+          <a:p>
+            <a:endParaRPr lang="en-US"/>
+          </a:p>
+        </p:txBody>
+      </p:sp>
+      <p:sp>
+        <p:nvSpPr>
+          <p:cNvPr id="4" name="Slide Number Placeholder 3">
+            <a:extLst>
+              <a:ext uri="{FF2B5EF4-FFF2-40B4-BE49-F238E27FC236}">
+                <a16:creationId xmlns:a16="http://schemas.microsoft.com/office/drawing/2014/main" id="{95C12591-D356-DFBC-6A7A-AE673D72D0DB}"/>
               </a:ext>
             </a:extLst>
           </p:cNvPr>
@@ -1256,7 +1980,7 @@
     </p:spTree>
     <p:extLst>
       <p:ext uri="{BB962C8B-B14F-4D97-AF65-F5344CB8AC3E}">
-        <p14:creationId xmlns:p14="http://schemas.microsoft.com/office/powerpoint/2010/main" val="416283607"/>
+        <p14:creationId xmlns:p14="http://schemas.microsoft.com/office/powerpoint/2010/main" val="756950293"/>
       </p:ext>
     </p:extLst>
   </p:cSld>
@@ -1274,7 +1998,7 @@
         <p:cNvPr id="1" name="">
           <a:extLst>
             <a:ext uri="{FF2B5EF4-FFF2-40B4-BE49-F238E27FC236}">
-              <a16:creationId xmlns:a16="http://schemas.microsoft.com/office/drawing/2014/main" id="{32AE0C6F-AF1D-6672-90C8-DF7E9C274BEE}"/>
+              <a16:creationId xmlns:a16="http://schemas.microsoft.com/office/drawing/2014/main" id="{610BE557-55C5-7D40-3BB0-C5F0D691570E}"/>
             </a:ext>
           </a:extLst>
         </p:cNvPr>
@@ -1294,7 +2018,7 @@
           <p:cNvPr id="2" name="Slide Image Placeholder 1">
             <a:extLst>
               <a:ext uri="{FF2B5EF4-FFF2-40B4-BE49-F238E27FC236}">
-                <a16:creationId xmlns:a16="http://schemas.microsoft.com/office/drawing/2014/main" id="{4CA6F85E-CB21-EEA6-CFE6-7DD844EA6B62}"/>
+                <a16:creationId xmlns:a16="http://schemas.microsoft.com/office/drawing/2014/main" id="{285EDAB2-1F12-5585-1512-FB1D7009517A}"/>
               </a:ext>
             </a:extLst>
           </p:cNvPr>
@@ -1312,7 +2036,7 @@
           <p:cNvPr id="3" name="Notes Placeholder 2">
             <a:extLst>
               <a:ext uri="{FF2B5EF4-FFF2-40B4-BE49-F238E27FC236}">
-                <a16:creationId xmlns:a16="http://schemas.microsoft.com/office/drawing/2014/main" id="{5733D9FD-0D01-64C8-2E06-A6BD13002538}"/>
+                <a16:creationId xmlns:a16="http://schemas.microsoft.com/office/drawing/2014/main" id="{82E505C9-D1D3-A6F5-D930-9C35AB0487EB}"/>
               </a:ext>
             </a:extLst>
           </p:cNvPr>
@@ -1345,7 +2069,7 @@
           <p:cNvPr id="4" name="Slide Number Placeholder 3">
             <a:extLst>
               <a:ext uri="{FF2B5EF4-FFF2-40B4-BE49-F238E27FC236}">
-                <a16:creationId xmlns:a16="http://schemas.microsoft.com/office/drawing/2014/main" id="{4712C160-604A-905C-39D1-5AF81D6D8DF4}"/>
+                <a16:creationId xmlns:a16="http://schemas.microsoft.com/office/drawing/2014/main" id="{C603E5AA-EE2A-A8D1-9B43-4074125CD2A3}"/>
               </a:ext>
             </a:extLst>
           </p:cNvPr>
@@ -1432,7 +2156,7 @@
     </p:spTree>
     <p:extLst>
       <p:ext uri="{BB962C8B-B14F-4D97-AF65-F5344CB8AC3E}">
-        <p14:creationId xmlns:p14="http://schemas.microsoft.com/office/powerpoint/2010/main" val="1895380026"/>
+        <p14:creationId xmlns:p14="http://schemas.microsoft.com/office/powerpoint/2010/main" val="416283607"/>
       </p:ext>
     </p:extLst>
   </p:cSld>
@@ -1450,7 +2174,7 @@
         <p:cNvPr id="1" name="">
           <a:extLst>
             <a:ext uri="{FF2B5EF4-FFF2-40B4-BE49-F238E27FC236}">
-              <a16:creationId xmlns:a16="http://schemas.microsoft.com/office/drawing/2014/main" id="{5970C9EF-185A-383A-F130-A0272FD0AEF9}"/>
+              <a16:creationId xmlns:a16="http://schemas.microsoft.com/office/drawing/2014/main" id="{D172731B-5D1E-4C10-553E-5DA3B5E1F1C7}"/>
             </a:ext>
           </a:extLst>
         </p:cNvPr>
@@ -1470,7 +2194,7 @@
           <p:cNvPr id="2" name="Slide Image Placeholder 1">
             <a:extLst>
               <a:ext uri="{FF2B5EF4-FFF2-40B4-BE49-F238E27FC236}">
-                <a16:creationId xmlns:a16="http://schemas.microsoft.com/office/drawing/2014/main" id="{7E412595-1DC0-7CDE-1EFC-5611D12A8772}"/>
+                <a16:creationId xmlns:a16="http://schemas.microsoft.com/office/drawing/2014/main" id="{C342C748-A787-9DB9-C69D-C2D923C30613}"/>
               </a:ext>
             </a:extLst>
           </p:cNvPr>
@@ -1488,7 +2212,7 @@
           <p:cNvPr id="3" name="Notes Placeholder 2">
             <a:extLst>
               <a:ext uri="{FF2B5EF4-FFF2-40B4-BE49-F238E27FC236}">
-                <a16:creationId xmlns:a16="http://schemas.microsoft.com/office/drawing/2014/main" id="{BB5DD665-2887-B8D9-B5C6-D0A71F3F20B0}"/>
+                <a16:creationId xmlns:a16="http://schemas.microsoft.com/office/drawing/2014/main" id="{CC356C0D-781E-33ED-F8A3-8FCC8228C7C0}"/>
               </a:ext>
             </a:extLst>
           </p:cNvPr>
@@ -1521,7 +2245,183 @@
           <p:cNvPr id="4" name="Slide Number Placeholder 3">
             <a:extLst>
               <a:ext uri="{FF2B5EF4-FFF2-40B4-BE49-F238E27FC236}">
-                <a16:creationId xmlns:a16="http://schemas.microsoft.com/office/drawing/2014/main" id="{F08C123D-B5A2-2C15-0859-DA29E4827E29}"/>
+                <a16:creationId xmlns:a16="http://schemas.microsoft.com/office/drawing/2014/main" id="{C628401D-3D8A-F84E-9896-EE34B49956FA}"/>
+              </a:ext>
+            </a:extLst>
+          </p:cNvPr>
+          <p:cNvSpPr>
+            <a:spLocks noGrp="1"/>
+          </p:cNvSpPr>
+          <p:nvPr>
+            <p:ph type="sldNum" sz="quarter" idx="5"/>
+          </p:nvPr>
+        </p:nvSpPr>
+        <p:spPr/>
+        <p:txBody>
+          <a:bodyPr/>
+          <a:lstStyle/>
+          <a:p>
+            <a:pPr marL="0" marR="0" lvl="0" indent="0" algn="r" defTabSz="914400" rtl="0" eaLnBrk="1" fontAlgn="auto" latinLnBrk="0" hangingPunct="1">
+              <a:lnSpc>
+                <a:spcPct val="100000"/>
+              </a:lnSpc>
+              <a:spcBef>
+                <a:spcPts val="0"/>
+              </a:spcBef>
+              <a:spcAft>
+                <a:spcPts val="0"/>
+              </a:spcAft>
+              <a:buClrTx/>
+              <a:buSzTx/>
+              <a:buFontTx/>
+              <a:buNone/>
+              <a:tabLst/>
+              <a:defRPr/>
+            </a:pPr>
+            <a:fld id="{EEFC255A-7693-4C43-B4AC-8A4920D60E3E}" type="slidenum">
+              <a:rPr kumimoji="0" lang="en-US" sz="1200" b="0" i="0" u="none" strike="noStrike" kern="1200" cap="none" spc="0" normalizeH="0" baseline="0" noProof="0" smtClean="0">
+                <a:ln>
+                  <a:noFill/>
+                </a:ln>
+                <a:solidFill>
+                  <a:prstClr val="black"/>
+                </a:solidFill>
+                <a:effectLst/>
+                <a:uLnTx/>
+                <a:uFillTx/>
+                <a:latin typeface="Calibri" panose="020F0502020204030204"/>
+                <a:ea typeface="+mn-ea"/>
+                <a:cs typeface="+mn-cs"/>
+              </a:rPr>
+              <a:pPr marL="0" marR="0" lvl="0" indent="0" algn="r" defTabSz="914400" rtl="0" eaLnBrk="1" fontAlgn="auto" latinLnBrk="0" hangingPunct="1">
+                <a:lnSpc>
+                  <a:spcPct val="100000"/>
+                </a:lnSpc>
+                <a:spcBef>
+                  <a:spcPts val="0"/>
+                </a:spcBef>
+                <a:spcAft>
+                  <a:spcPts val="0"/>
+                </a:spcAft>
+                <a:buClrTx/>
+                <a:buSzTx/>
+                <a:buFontTx/>
+                <a:buNone/>
+                <a:tabLst/>
+                <a:defRPr/>
+              </a:pPr>
+              <a:t>5</a:t>
+            </a:fld>
+            <a:endParaRPr kumimoji="0" lang="en-US" sz="1200" b="0" i="0" u="none" strike="noStrike" kern="1200" cap="none" spc="0" normalizeH="0" baseline="0" noProof="0">
+              <a:ln>
+                <a:noFill/>
+              </a:ln>
+              <a:solidFill>
+                <a:prstClr val="black"/>
+              </a:solidFill>
+              <a:effectLst/>
+              <a:uLnTx/>
+              <a:uFillTx/>
+              <a:latin typeface="Calibri" panose="020F0502020204030204"/>
+              <a:ea typeface="+mn-ea"/>
+              <a:cs typeface="+mn-cs"/>
+            </a:endParaRPr>
+          </a:p>
+        </p:txBody>
+      </p:sp>
+    </p:spTree>
+    <p:extLst>
+      <p:ext uri="{BB962C8B-B14F-4D97-AF65-F5344CB8AC3E}">
+        <p14:creationId xmlns:p14="http://schemas.microsoft.com/office/powerpoint/2010/main" val="4108271022"/>
+      </p:ext>
+    </p:extLst>
+  </p:cSld>
+  <p:clrMapOvr>
+    <a:masterClrMapping/>
+  </p:clrMapOvr>
+</p:notes>
+</file>
+
+<file path=ppt/notesSlides/notesSlide5.xml><?xml version="1.0" encoding="utf-8"?>
+<p:notes xmlns:a="http://schemas.openxmlformats.org/drawingml/2006/main" xmlns:r="http://schemas.openxmlformats.org/officeDocument/2006/relationships" xmlns:p="http://schemas.openxmlformats.org/presentationml/2006/main">
+  <p:cSld>
+    <p:spTree>
+      <p:nvGrpSpPr>
+        <p:cNvPr id="1" name="">
+          <a:extLst>
+            <a:ext uri="{FF2B5EF4-FFF2-40B4-BE49-F238E27FC236}">
+              <a16:creationId xmlns:a16="http://schemas.microsoft.com/office/drawing/2014/main" id="{4D45CD92-6327-6134-D6F4-9693E19957AE}"/>
+            </a:ext>
+          </a:extLst>
+        </p:cNvPr>
+        <p:cNvGrpSpPr/>
+        <p:nvPr/>
+      </p:nvGrpSpPr>
+      <p:grpSpPr>
+        <a:xfrm>
+          <a:off x="0" y="0"/>
+          <a:ext cx="0" cy="0"/>
+          <a:chOff x="0" y="0"/>
+          <a:chExt cx="0" cy="0"/>
+        </a:xfrm>
+      </p:grpSpPr>
+      <p:sp>
+        <p:nvSpPr>
+          <p:cNvPr id="2" name="Slide Image Placeholder 1">
+            <a:extLst>
+              <a:ext uri="{FF2B5EF4-FFF2-40B4-BE49-F238E27FC236}">
+                <a16:creationId xmlns:a16="http://schemas.microsoft.com/office/drawing/2014/main" id="{8DB50357-9CDF-C4DD-94F6-A3380DA40850}"/>
+              </a:ext>
+            </a:extLst>
+          </p:cNvPr>
+          <p:cNvSpPr>
+            <a:spLocks noGrp="1" noRot="1" noChangeAspect="1"/>
+          </p:cNvSpPr>
+          <p:nvPr>
+            <p:ph type="sldImg"/>
+          </p:nvPr>
+        </p:nvSpPr>
+        <p:spPr/>
+      </p:sp>
+      <p:sp>
+        <p:nvSpPr>
+          <p:cNvPr id="3" name="Notes Placeholder 2">
+            <a:extLst>
+              <a:ext uri="{FF2B5EF4-FFF2-40B4-BE49-F238E27FC236}">
+                <a16:creationId xmlns:a16="http://schemas.microsoft.com/office/drawing/2014/main" id="{21D5F516-D9CD-941E-835F-FA29C6974019}"/>
+              </a:ext>
+            </a:extLst>
+          </p:cNvPr>
+          <p:cNvSpPr>
+            <a:spLocks noGrp="1"/>
+          </p:cNvSpPr>
+          <p:nvPr>
+            <p:ph type="body" idx="1"/>
+          </p:nvPr>
+        </p:nvSpPr>
+        <p:spPr/>
+        <p:txBody>
+          <a:bodyPr/>
+          <a:lstStyle/>
+          <a:p>
+            <a:pPr lvl="1"/>
+            <a:endParaRPr lang="en-US">
+              <a:solidFill>
+                <a:srgbClr val="077FC7"/>
+              </a:solidFill>
+            </a:endParaRPr>
+          </a:p>
+          <a:p>
+            <a:endParaRPr lang="en-US"/>
+          </a:p>
+        </p:txBody>
+      </p:sp>
+      <p:sp>
+        <p:nvSpPr>
+          <p:cNvPr id="4" name="Slide Number Placeholder 3">
+            <a:extLst>
+              <a:ext uri="{FF2B5EF4-FFF2-40B4-BE49-F238E27FC236}">
+                <a16:creationId xmlns:a16="http://schemas.microsoft.com/office/drawing/2014/main" id="{AF747635-0BDE-1812-47A4-7F0511220AE5}"/>
               </a:ext>
             </a:extLst>
           </p:cNvPr>
@@ -1608,7 +2508,7 @@
     </p:spTree>
     <p:extLst>
       <p:ext uri="{BB962C8B-B14F-4D97-AF65-F5344CB8AC3E}">
-        <p14:creationId xmlns:p14="http://schemas.microsoft.com/office/powerpoint/2010/main" val="62980263"/>
+        <p14:creationId xmlns:p14="http://schemas.microsoft.com/office/powerpoint/2010/main" val="1658141738"/>
       </p:ext>
     </p:extLst>
   </p:cSld>
@@ -1618,7 +2518,7 @@
 </p:notes>
 </file>
 
-<file path=ppt/notesSlides/notesSlide5.xml><?xml version="1.0" encoding="utf-8"?>
+<file path=ppt/notesSlides/notesSlide6.xml><?xml version="1.0" encoding="utf-8"?>
 <p:notes xmlns:a="http://schemas.openxmlformats.org/drawingml/2006/main" xmlns:r="http://schemas.openxmlformats.org/officeDocument/2006/relationships" xmlns:p="http://schemas.openxmlformats.org/presentationml/2006/main">
   <p:cSld>
     <p:spTree>
@@ -1626,7 +2526,7 @@
         <p:cNvPr id="1" name="">
           <a:extLst>
             <a:ext uri="{FF2B5EF4-FFF2-40B4-BE49-F238E27FC236}">
-              <a16:creationId xmlns:a16="http://schemas.microsoft.com/office/drawing/2014/main" id="{4ED5F394-F335-0F9C-BD82-0DFA08D8EE9D}"/>
+              <a16:creationId xmlns:a16="http://schemas.microsoft.com/office/drawing/2014/main" id="{B085AF85-2CB4-6D03-DA9D-3299F81C480F}"/>
             </a:ext>
           </a:extLst>
         </p:cNvPr>
@@ -1646,7 +2546,7 @@
           <p:cNvPr id="2" name="Slide Image Placeholder 1">
             <a:extLst>
               <a:ext uri="{FF2B5EF4-FFF2-40B4-BE49-F238E27FC236}">
-                <a16:creationId xmlns:a16="http://schemas.microsoft.com/office/drawing/2014/main" id="{638468C3-A7A0-E971-9EA1-B390EF040424}"/>
+                <a16:creationId xmlns:a16="http://schemas.microsoft.com/office/drawing/2014/main" id="{063825FC-54C5-806B-87EF-1ECDA01CD7E6}"/>
               </a:ext>
             </a:extLst>
           </p:cNvPr>
@@ -1664,7 +2564,7 @@
           <p:cNvPr id="3" name="Notes Placeholder 2">
             <a:extLst>
               <a:ext uri="{FF2B5EF4-FFF2-40B4-BE49-F238E27FC236}">
-                <a16:creationId xmlns:a16="http://schemas.microsoft.com/office/drawing/2014/main" id="{528F6600-9EE0-E4DD-C569-F574730B171F}"/>
+                <a16:creationId xmlns:a16="http://schemas.microsoft.com/office/drawing/2014/main" id="{54CD45C2-A81F-C29D-5356-63AF07C66D97}"/>
               </a:ext>
             </a:extLst>
           </p:cNvPr>
@@ -1697,7 +2597,7 @@
           <p:cNvPr id="4" name="Slide Number Placeholder 3">
             <a:extLst>
               <a:ext uri="{FF2B5EF4-FFF2-40B4-BE49-F238E27FC236}">
-                <a16:creationId xmlns:a16="http://schemas.microsoft.com/office/drawing/2014/main" id="{E7B7028D-6496-AA3E-48BF-E5F177D9F45A}"/>
+                <a16:creationId xmlns:a16="http://schemas.microsoft.com/office/drawing/2014/main" id="{3634DDED-C6B2-38BD-BE05-E7308B0677E6}"/>
               </a:ext>
             </a:extLst>
           </p:cNvPr>
@@ -1784,7 +2684,7 @@
     </p:spTree>
     <p:extLst>
       <p:ext uri="{BB962C8B-B14F-4D97-AF65-F5344CB8AC3E}">
-        <p14:creationId xmlns:p14="http://schemas.microsoft.com/office/powerpoint/2010/main" val="3492822132"/>
+        <p14:creationId xmlns:p14="http://schemas.microsoft.com/office/powerpoint/2010/main" val="2875004520"/>
       </p:ext>
     </p:extLst>
   </p:cSld>
@@ -1794,7 +2694,7 @@
 </p:notes>
 </file>
 
-<file path=ppt/notesSlides/notesSlide6.xml><?xml version="1.0" encoding="utf-8"?>
+<file path=ppt/notesSlides/notesSlide7.xml><?xml version="1.0" encoding="utf-8"?>
 <p:notes xmlns:a="http://schemas.openxmlformats.org/drawingml/2006/main" xmlns:r="http://schemas.openxmlformats.org/officeDocument/2006/relationships" xmlns:p="http://schemas.openxmlformats.org/presentationml/2006/main">
   <p:cSld>
     <p:spTree>
@@ -1802,7 +2702,7 @@
         <p:cNvPr id="1" name="">
           <a:extLst>
             <a:ext uri="{FF2B5EF4-FFF2-40B4-BE49-F238E27FC236}">
-              <a16:creationId xmlns:a16="http://schemas.microsoft.com/office/drawing/2014/main" id="{FB80D371-165C-F1DC-3818-8AFEA58F897A}"/>
+              <a16:creationId xmlns:a16="http://schemas.microsoft.com/office/drawing/2014/main" id="{32AE0C6F-AF1D-6672-90C8-DF7E9C274BEE}"/>
             </a:ext>
           </a:extLst>
         </p:cNvPr>
@@ -1822,7 +2722,7 @@
           <p:cNvPr id="2" name="Slide Image Placeholder 1">
             <a:extLst>
               <a:ext uri="{FF2B5EF4-FFF2-40B4-BE49-F238E27FC236}">
-                <a16:creationId xmlns:a16="http://schemas.microsoft.com/office/drawing/2014/main" id="{0B747E98-87A1-630A-9342-54722B3AC496}"/>
+                <a16:creationId xmlns:a16="http://schemas.microsoft.com/office/drawing/2014/main" id="{4CA6F85E-CB21-EEA6-CFE6-7DD844EA6B62}"/>
               </a:ext>
             </a:extLst>
           </p:cNvPr>
@@ -1840,7 +2740,7 @@
           <p:cNvPr id="3" name="Notes Placeholder 2">
             <a:extLst>
               <a:ext uri="{FF2B5EF4-FFF2-40B4-BE49-F238E27FC236}">
-                <a16:creationId xmlns:a16="http://schemas.microsoft.com/office/drawing/2014/main" id="{E211F158-51F3-B786-3D6D-93A3180AEDBD}"/>
+                <a16:creationId xmlns:a16="http://schemas.microsoft.com/office/drawing/2014/main" id="{5733D9FD-0D01-64C8-2E06-A6BD13002538}"/>
               </a:ext>
             </a:extLst>
           </p:cNvPr>
@@ -1873,7 +2773,183 @@
           <p:cNvPr id="4" name="Slide Number Placeholder 3">
             <a:extLst>
               <a:ext uri="{FF2B5EF4-FFF2-40B4-BE49-F238E27FC236}">
-                <a16:creationId xmlns:a16="http://schemas.microsoft.com/office/drawing/2014/main" id="{E307D5FB-09BE-4C18-A701-73A27059BE9B}"/>
+                <a16:creationId xmlns:a16="http://schemas.microsoft.com/office/drawing/2014/main" id="{4712C160-604A-905C-39D1-5AF81D6D8DF4}"/>
+              </a:ext>
+            </a:extLst>
+          </p:cNvPr>
+          <p:cNvSpPr>
+            <a:spLocks noGrp="1"/>
+          </p:cNvSpPr>
+          <p:nvPr>
+            <p:ph type="sldNum" sz="quarter" idx="5"/>
+          </p:nvPr>
+        </p:nvSpPr>
+        <p:spPr/>
+        <p:txBody>
+          <a:bodyPr/>
+          <a:lstStyle/>
+          <a:p>
+            <a:pPr marL="0" marR="0" lvl="0" indent="0" algn="r" defTabSz="914400" rtl="0" eaLnBrk="1" fontAlgn="auto" latinLnBrk="0" hangingPunct="1">
+              <a:lnSpc>
+                <a:spcPct val="100000"/>
+              </a:lnSpc>
+              <a:spcBef>
+                <a:spcPts val="0"/>
+              </a:spcBef>
+              <a:spcAft>
+                <a:spcPts val="0"/>
+              </a:spcAft>
+              <a:buClrTx/>
+              <a:buSzTx/>
+              <a:buFontTx/>
+              <a:buNone/>
+              <a:tabLst/>
+              <a:defRPr/>
+            </a:pPr>
+            <a:fld id="{EEFC255A-7693-4C43-B4AC-8A4920D60E3E}" type="slidenum">
+              <a:rPr kumimoji="0" lang="en-US" sz="1200" b="0" i="0" u="none" strike="noStrike" kern="1200" cap="none" spc="0" normalizeH="0" baseline="0" noProof="0" smtClean="0">
+                <a:ln>
+                  <a:noFill/>
+                </a:ln>
+                <a:solidFill>
+                  <a:prstClr val="black"/>
+                </a:solidFill>
+                <a:effectLst/>
+                <a:uLnTx/>
+                <a:uFillTx/>
+                <a:latin typeface="Calibri" panose="020F0502020204030204"/>
+                <a:ea typeface="+mn-ea"/>
+                <a:cs typeface="+mn-cs"/>
+              </a:rPr>
+              <a:pPr marL="0" marR="0" lvl="0" indent="0" algn="r" defTabSz="914400" rtl="0" eaLnBrk="1" fontAlgn="auto" latinLnBrk="0" hangingPunct="1">
+                <a:lnSpc>
+                  <a:spcPct val="100000"/>
+                </a:lnSpc>
+                <a:spcBef>
+                  <a:spcPts val="0"/>
+                </a:spcBef>
+                <a:spcAft>
+                  <a:spcPts val="0"/>
+                </a:spcAft>
+                <a:buClrTx/>
+                <a:buSzTx/>
+                <a:buFontTx/>
+                <a:buNone/>
+                <a:tabLst/>
+                <a:defRPr/>
+              </a:pPr>
+              <a:t>8</a:t>
+            </a:fld>
+            <a:endParaRPr kumimoji="0" lang="en-US" sz="1200" b="0" i="0" u="none" strike="noStrike" kern="1200" cap="none" spc="0" normalizeH="0" baseline="0" noProof="0">
+              <a:ln>
+                <a:noFill/>
+              </a:ln>
+              <a:solidFill>
+                <a:prstClr val="black"/>
+              </a:solidFill>
+              <a:effectLst/>
+              <a:uLnTx/>
+              <a:uFillTx/>
+              <a:latin typeface="Calibri" panose="020F0502020204030204"/>
+              <a:ea typeface="+mn-ea"/>
+              <a:cs typeface="+mn-cs"/>
+            </a:endParaRPr>
+          </a:p>
+        </p:txBody>
+      </p:sp>
+    </p:spTree>
+    <p:extLst>
+      <p:ext uri="{BB962C8B-B14F-4D97-AF65-F5344CB8AC3E}">
+        <p14:creationId xmlns:p14="http://schemas.microsoft.com/office/powerpoint/2010/main" val="1895380026"/>
+      </p:ext>
+    </p:extLst>
+  </p:cSld>
+  <p:clrMapOvr>
+    <a:masterClrMapping/>
+  </p:clrMapOvr>
+</p:notes>
+</file>
+
+<file path=ppt/notesSlides/notesSlide8.xml><?xml version="1.0" encoding="utf-8"?>
+<p:notes xmlns:a="http://schemas.openxmlformats.org/drawingml/2006/main" xmlns:r="http://schemas.openxmlformats.org/officeDocument/2006/relationships" xmlns:p="http://schemas.openxmlformats.org/presentationml/2006/main">
+  <p:cSld>
+    <p:spTree>
+      <p:nvGrpSpPr>
+        <p:cNvPr id="1" name="">
+          <a:extLst>
+            <a:ext uri="{FF2B5EF4-FFF2-40B4-BE49-F238E27FC236}">
+              <a16:creationId xmlns:a16="http://schemas.microsoft.com/office/drawing/2014/main" id="{FF9110F1-2F64-7C93-623E-F324F857FBC7}"/>
+            </a:ext>
+          </a:extLst>
+        </p:cNvPr>
+        <p:cNvGrpSpPr/>
+        <p:nvPr/>
+      </p:nvGrpSpPr>
+      <p:grpSpPr>
+        <a:xfrm>
+          <a:off x="0" y="0"/>
+          <a:ext cx="0" cy="0"/>
+          <a:chOff x="0" y="0"/>
+          <a:chExt cx="0" cy="0"/>
+        </a:xfrm>
+      </p:grpSpPr>
+      <p:sp>
+        <p:nvSpPr>
+          <p:cNvPr id="2" name="Slide Image Placeholder 1">
+            <a:extLst>
+              <a:ext uri="{FF2B5EF4-FFF2-40B4-BE49-F238E27FC236}">
+                <a16:creationId xmlns:a16="http://schemas.microsoft.com/office/drawing/2014/main" id="{84C3C495-C757-0DE8-DD3B-BCF00B9DAEF5}"/>
+              </a:ext>
+            </a:extLst>
+          </p:cNvPr>
+          <p:cNvSpPr>
+            <a:spLocks noGrp="1" noRot="1" noChangeAspect="1"/>
+          </p:cNvSpPr>
+          <p:nvPr>
+            <p:ph type="sldImg"/>
+          </p:nvPr>
+        </p:nvSpPr>
+        <p:spPr/>
+      </p:sp>
+      <p:sp>
+        <p:nvSpPr>
+          <p:cNvPr id="3" name="Notes Placeholder 2">
+            <a:extLst>
+              <a:ext uri="{FF2B5EF4-FFF2-40B4-BE49-F238E27FC236}">
+                <a16:creationId xmlns:a16="http://schemas.microsoft.com/office/drawing/2014/main" id="{5192C99D-9369-EAAA-F106-BF154170DE07}"/>
+              </a:ext>
+            </a:extLst>
+          </p:cNvPr>
+          <p:cNvSpPr>
+            <a:spLocks noGrp="1"/>
+          </p:cNvSpPr>
+          <p:nvPr>
+            <p:ph type="body" idx="1"/>
+          </p:nvPr>
+        </p:nvSpPr>
+        <p:spPr/>
+        <p:txBody>
+          <a:bodyPr/>
+          <a:lstStyle/>
+          <a:p>
+            <a:pPr lvl="1"/>
+            <a:endParaRPr lang="en-US">
+              <a:solidFill>
+                <a:srgbClr val="077FC7"/>
+              </a:solidFill>
+            </a:endParaRPr>
+          </a:p>
+          <a:p>
+            <a:endParaRPr lang="en-US"/>
+          </a:p>
+        </p:txBody>
+      </p:sp>
+      <p:sp>
+        <p:nvSpPr>
+          <p:cNvPr id="4" name="Slide Number Placeholder 3">
+            <a:extLst>
+              <a:ext uri="{FF2B5EF4-FFF2-40B4-BE49-F238E27FC236}">
+                <a16:creationId xmlns:a16="http://schemas.microsoft.com/office/drawing/2014/main" id="{DA8ABEC6-1BF0-AEF9-CFE7-43A06C96F56B}"/>
               </a:ext>
             </a:extLst>
           </p:cNvPr>
@@ -1960,7 +3036,7 @@
     </p:spTree>
     <p:extLst>
       <p:ext uri="{BB962C8B-B14F-4D97-AF65-F5344CB8AC3E}">
-        <p14:creationId xmlns:p14="http://schemas.microsoft.com/office/powerpoint/2010/main" val="3869591512"/>
+        <p14:creationId xmlns:p14="http://schemas.microsoft.com/office/powerpoint/2010/main" val="1522840538"/>
       </p:ext>
     </p:extLst>
   </p:cSld>
@@ -1970,7 +3046,7 @@
 </p:notes>
 </file>
 
-<file path=ppt/notesSlides/notesSlide7.xml><?xml version="1.0" encoding="utf-8"?>
+<file path=ppt/notesSlides/notesSlide9.xml><?xml version="1.0" encoding="utf-8"?>
 <p:notes xmlns:a="http://schemas.openxmlformats.org/drawingml/2006/main" xmlns:r="http://schemas.openxmlformats.org/officeDocument/2006/relationships" xmlns:p="http://schemas.openxmlformats.org/presentationml/2006/main">
   <p:cSld>
     <p:spTree>
@@ -1978,7 +3054,7 @@
         <p:cNvPr id="1" name="">
           <a:extLst>
             <a:ext uri="{FF2B5EF4-FFF2-40B4-BE49-F238E27FC236}">
-              <a16:creationId xmlns:a16="http://schemas.microsoft.com/office/drawing/2014/main" id="{6451D497-76B0-0006-4B9B-6BFBF245F958}"/>
+              <a16:creationId xmlns:a16="http://schemas.microsoft.com/office/drawing/2014/main" id="{102812B8-D44D-4685-481F-3D02A781A455}"/>
             </a:ext>
           </a:extLst>
         </p:cNvPr>
@@ -1998,7 +3074,7 @@
           <p:cNvPr id="2" name="Slide Image Placeholder 1">
             <a:extLst>
               <a:ext uri="{FF2B5EF4-FFF2-40B4-BE49-F238E27FC236}">
-                <a16:creationId xmlns:a16="http://schemas.microsoft.com/office/drawing/2014/main" id="{3DD3A122-66C4-B761-C338-21E7D952CDC2}"/>
+                <a16:creationId xmlns:a16="http://schemas.microsoft.com/office/drawing/2014/main" id="{B19AD806-DA56-0D5F-CDA9-B33E2A593AA8}"/>
               </a:ext>
             </a:extLst>
           </p:cNvPr>
@@ -2016,7 +3092,7 @@
           <p:cNvPr id="3" name="Notes Placeholder 2">
             <a:extLst>
               <a:ext uri="{FF2B5EF4-FFF2-40B4-BE49-F238E27FC236}">
-                <a16:creationId xmlns:a16="http://schemas.microsoft.com/office/drawing/2014/main" id="{BCD52DE6-1164-E575-EBF3-623F16A7BE77}"/>
+                <a16:creationId xmlns:a16="http://schemas.microsoft.com/office/drawing/2014/main" id="{1E4B8DBF-C4D9-8D34-2375-62701C5AB75C}"/>
               </a:ext>
             </a:extLst>
           </p:cNvPr>
@@ -2032,7 +3108,15 @@
           <a:bodyPr/>
           <a:lstStyle/>
           <a:p>
-            <a:endParaRPr lang="sv-SE" dirty="0"/>
+            <a:pPr lvl="1"/>
+            <a:endParaRPr lang="en-US">
+              <a:solidFill>
+                <a:srgbClr val="077FC7"/>
+              </a:solidFill>
+            </a:endParaRPr>
+          </a:p>
+          <a:p>
+            <a:endParaRPr lang="en-US"/>
           </a:p>
         </p:txBody>
       </p:sp>
@@ -2041,7 +3125,7 @@
           <p:cNvPr id="4" name="Slide Number Placeholder 3">
             <a:extLst>
               <a:ext uri="{FF2B5EF4-FFF2-40B4-BE49-F238E27FC236}">
-                <a16:creationId xmlns:a16="http://schemas.microsoft.com/office/drawing/2014/main" id="{CEC50C64-DEE7-F893-F24F-EB7D03342DAF}"/>
+                <a16:creationId xmlns:a16="http://schemas.microsoft.com/office/drawing/2014/main" id="{64F0882E-82DB-94A2-4995-2654DA139892}"/>
               </a:ext>
             </a:extLst>
           </p:cNvPr>
@@ -2057,18 +3141,78 @@
           <a:bodyPr/>
           <a:lstStyle/>
           <a:p>
-            <a:fld id="{C856C2C0-8A41-D540-A192-012301397A6B}" type="slidenum">
-              <a:rPr lang="en-US" smtClean="0"/>
-              <a:t>11</a:t>
+            <a:pPr marL="0" marR="0" lvl="0" indent="0" algn="r" defTabSz="914400" rtl="0" eaLnBrk="1" fontAlgn="auto" latinLnBrk="0" hangingPunct="1">
+              <a:lnSpc>
+                <a:spcPct val="100000"/>
+              </a:lnSpc>
+              <a:spcBef>
+                <a:spcPts val="0"/>
+              </a:spcBef>
+              <a:spcAft>
+                <a:spcPts val="0"/>
+              </a:spcAft>
+              <a:buClrTx/>
+              <a:buSzTx/>
+              <a:buFontTx/>
+              <a:buNone/>
+              <a:tabLst/>
+              <a:defRPr/>
+            </a:pPr>
+            <a:fld id="{EEFC255A-7693-4C43-B4AC-8A4920D60E3E}" type="slidenum">
+              <a:rPr kumimoji="0" lang="en-US" sz="1200" b="0" i="0" u="none" strike="noStrike" kern="1200" cap="none" spc="0" normalizeH="0" baseline="0" noProof="0" smtClean="0">
+                <a:ln>
+                  <a:noFill/>
+                </a:ln>
+                <a:solidFill>
+                  <a:prstClr val="black"/>
+                </a:solidFill>
+                <a:effectLst/>
+                <a:uLnTx/>
+                <a:uFillTx/>
+                <a:latin typeface="Calibri" panose="020F0502020204030204"/>
+                <a:ea typeface="+mn-ea"/>
+                <a:cs typeface="+mn-cs"/>
+              </a:rPr>
+              <a:pPr marL="0" marR="0" lvl="0" indent="0" algn="r" defTabSz="914400" rtl="0" eaLnBrk="1" fontAlgn="auto" latinLnBrk="0" hangingPunct="1">
+                <a:lnSpc>
+                  <a:spcPct val="100000"/>
+                </a:lnSpc>
+                <a:spcBef>
+                  <a:spcPts val="0"/>
+                </a:spcBef>
+                <a:spcAft>
+                  <a:spcPts val="0"/>
+                </a:spcAft>
+                <a:buClrTx/>
+                <a:buSzTx/>
+                <a:buFontTx/>
+                <a:buNone/>
+                <a:tabLst/>
+                <a:defRPr/>
+              </a:pPr>
+              <a:t>10</a:t>
             </a:fld>
-            <a:endParaRPr lang="en-US"/>
+            <a:endParaRPr kumimoji="0" lang="en-US" sz="1200" b="0" i="0" u="none" strike="noStrike" kern="1200" cap="none" spc="0" normalizeH="0" baseline="0" noProof="0">
+              <a:ln>
+                <a:noFill/>
+              </a:ln>
+              <a:solidFill>
+                <a:prstClr val="black"/>
+              </a:solidFill>
+              <a:effectLst/>
+              <a:uLnTx/>
+              <a:uFillTx/>
+              <a:latin typeface="Calibri" panose="020F0502020204030204"/>
+              <a:ea typeface="+mn-ea"/>
+              <a:cs typeface="+mn-cs"/>
+            </a:endParaRPr>
           </a:p>
         </p:txBody>
       </p:sp>
     </p:spTree>
     <p:extLst>
       <p:ext uri="{BB962C8B-B14F-4D97-AF65-F5344CB8AC3E}">
-        <p14:creationId xmlns:p14="http://schemas.microsoft.com/office/powerpoint/2010/main" val="3208872060"/>
+        <p14:creationId xmlns:p14="http://schemas.microsoft.com/office/powerpoint/2010/main" val="1882808364"/>
       </p:ext>
     </p:extLst>
   </p:cSld>
@@ -2580,7 +3724,7 @@
           <a:p>
             <a:fld id="{3762C125-30CF-4B99-9700-8C37FFCF5BE5}" type="datetimeFigureOut">
               <a:rPr lang="en-US" smtClean="0"/>
-              <a:t>9/15/25</a:t>
+              <a:t>9/18/25</a:t>
             </a:fld>
             <a:endParaRPr lang="en-US"/>
           </a:p>
@@ -2832,7 +3976,7 @@
           <a:p>
             <a:fld id="{3762C125-30CF-4B99-9700-8C37FFCF5BE5}" type="datetimeFigureOut">
               <a:rPr lang="en-US" smtClean="0"/>
-              <a:t>9/15/25</a:t>
+              <a:t>9/18/25</a:t>
             </a:fld>
             <a:endParaRPr lang="en-US"/>
           </a:p>
@@ -3000,7 +4144,7 @@
           <a:p>
             <a:fld id="{3762C125-30CF-4B99-9700-8C37FFCF5BE5}" type="datetimeFigureOut">
               <a:rPr lang="en-US" smtClean="0"/>
-              <a:t>9/15/25</a:t>
+              <a:t>9/18/25</a:t>
             </a:fld>
             <a:endParaRPr lang="en-US"/>
           </a:p>
@@ -3178,7 +4322,7 @@
           <a:p>
             <a:fld id="{3762C125-30CF-4B99-9700-8C37FFCF5BE5}" type="datetimeFigureOut">
               <a:rPr lang="en-US" smtClean="0"/>
-              <a:t>9/15/25</a:t>
+              <a:t>9/18/25</a:t>
             </a:fld>
             <a:endParaRPr lang="en-US"/>
           </a:p>
@@ -4572,7 +5716,7 @@
           <a:p>
             <a:fld id="{3762C125-30CF-4B99-9700-8C37FFCF5BE5}" type="datetimeFigureOut">
               <a:rPr lang="en-US" smtClean="0"/>
-              <a:t>9/15/25</a:t>
+              <a:t>9/18/25</a:t>
             </a:fld>
             <a:endParaRPr lang="en-US"/>
           </a:p>
@@ -4801,7 +5945,7 @@
           <a:p>
             <a:fld id="{3762C125-30CF-4B99-9700-8C37FFCF5BE5}" type="datetimeFigureOut">
               <a:rPr lang="en-US" smtClean="0"/>
-              <a:t>9/15/25</a:t>
+              <a:t>9/18/25</a:t>
             </a:fld>
             <a:endParaRPr lang="en-US"/>
           </a:p>
@@ -5165,7 +6309,7 @@
           <a:p>
             <a:fld id="{3762C125-30CF-4B99-9700-8C37FFCF5BE5}" type="datetimeFigureOut">
               <a:rPr lang="en-US" smtClean="0"/>
-              <a:t>9/15/25</a:t>
+              <a:t>9/18/25</a:t>
             </a:fld>
             <a:endParaRPr lang="en-US"/>
           </a:p>
@@ -5282,7 +6426,7 @@
           <a:p>
             <a:fld id="{3762C125-30CF-4B99-9700-8C37FFCF5BE5}" type="datetimeFigureOut">
               <a:rPr lang="en-US" smtClean="0"/>
-              <a:t>9/15/25</a:t>
+              <a:t>9/18/25</a:t>
             </a:fld>
             <a:endParaRPr lang="en-US"/>
           </a:p>
@@ -5377,7 +6521,7 @@
           <a:p>
             <a:fld id="{3762C125-30CF-4B99-9700-8C37FFCF5BE5}" type="datetimeFigureOut">
               <a:rPr lang="en-US" smtClean="0"/>
-              <a:t>9/15/25</a:t>
+              <a:t>9/18/25</a:t>
             </a:fld>
             <a:endParaRPr lang="en-US"/>
           </a:p>
@@ -5588,7 +6732,7 @@
           <a:p>
             <a:fld id="{3762C125-30CF-4B99-9700-8C37FFCF5BE5}" type="datetimeFigureOut">
               <a:rPr lang="en-US" smtClean="0"/>
-              <a:t>9/15/25</a:t>
+              <a:t>9/18/25</a:t>
             </a:fld>
             <a:endParaRPr lang="en-US"/>
           </a:p>
@@ -6050,6 +7194,506 @@
         <p:cNvPr id="1" name="">
           <a:extLst>
             <a:ext uri="{FF2B5EF4-FFF2-40B4-BE49-F238E27FC236}">
+              <a16:creationId xmlns:a16="http://schemas.microsoft.com/office/drawing/2014/main" id="{24C9DE76-5DA5-0AE0-34B3-A378462B3E33}"/>
+            </a:ext>
+          </a:extLst>
+        </p:cNvPr>
+        <p:cNvGrpSpPr/>
+        <p:nvPr/>
+      </p:nvGrpSpPr>
+      <p:grpSpPr>
+        <a:xfrm>
+          <a:off x="0" y="0"/>
+          <a:ext cx="0" cy="0"/>
+          <a:chOff x="0" y="0"/>
+          <a:chExt cx="0" cy="0"/>
+        </a:xfrm>
+      </p:grpSpPr>
+      <p:sp>
+        <p:nvSpPr>
+          <p:cNvPr id="2" name="Title 1">
+            <a:extLst>
+              <a:ext uri="{FF2B5EF4-FFF2-40B4-BE49-F238E27FC236}">
+                <a16:creationId xmlns:a16="http://schemas.microsoft.com/office/drawing/2014/main" id="{C31077F8-0FAF-3D73-6218-F2DC89ECB77C}"/>
+              </a:ext>
+            </a:extLst>
+          </p:cNvPr>
+          <p:cNvSpPr>
+            <a:spLocks noGrp="1"/>
+          </p:cNvSpPr>
+          <p:nvPr>
+            <p:ph type="title"/>
+          </p:nvPr>
+        </p:nvSpPr>
+        <p:spPr>
+          <a:xfrm>
+            <a:off x="0" y="1"/>
+            <a:ext cx="11065267" cy="658368"/>
+          </a:xfrm>
+        </p:spPr>
+        <p:txBody>
+          <a:bodyPr>
+            <a:normAutofit/>
+          </a:bodyPr>
+          <a:lstStyle/>
+          <a:p>
+            <a:r>
+              <a:rPr lang="en-US" dirty="0"/>
+              <a:t>Variance explained </a:t>
+            </a:r>
+            <a:r>
+              <a:rPr lang="en-US" b="0" dirty="0"/>
+              <a:t>- Comparison</a:t>
+            </a:r>
+            <a:endParaRPr lang="en-US" dirty="0"/>
+          </a:p>
+        </p:txBody>
+      </p:sp>
+      <p:pic>
+        <p:nvPicPr>
+          <p:cNvPr id="4" name="Picture 3">
+            <a:extLst>
+              <a:ext uri="{FF2B5EF4-FFF2-40B4-BE49-F238E27FC236}">
+                <a16:creationId xmlns:a16="http://schemas.microsoft.com/office/drawing/2014/main" id="{9F4C20E3-0787-448F-B762-7CFA7D1BFF5C}"/>
+              </a:ext>
+            </a:extLst>
+          </p:cNvPr>
+          <p:cNvPicPr>
+            <a:picLocks noChangeAspect="1"/>
+          </p:cNvPicPr>
+          <p:nvPr/>
+        </p:nvPicPr>
+        <p:blipFill>
+          <a:blip r:embed="rId3"/>
+          <a:stretch>
+            <a:fillRect/>
+          </a:stretch>
+        </p:blipFill>
+        <p:spPr>
+          <a:xfrm>
+            <a:off x="228600" y="807721"/>
+            <a:ext cx="11734800" cy="5867400"/>
+          </a:xfrm>
+          <a:prstGeom prst="rect">
+            <a:avLst/>
+          </a:prstGeom>
+        </p:spPr>
+      </p:pic>
+    </p:spTree>
+    <p:extLst>
+      <p:ext uri="{BB962C8B-B14F-4D97-AF65-F5344CB8AC3E}">
+        <p14:creationId xmlns:p14="http://schemas.microsoft.com/office/powerpoint/2010/main" val="4193673010"/>
+      </p:ext>
+    </p:extLst>
+  </p:cSld>
+  <p:clrMapOvr>
+    <a:masterClrMapping/>
+  </p:clrMapOvr>
+</p:sld>
+</file>
+
+<file path=ppt/slides/slide11.xml><?xml version="1.0" encoding="utf-8"?>
+<p:sld xmlns:a="http://schemas.openxmlformats.org/drawingml/2006/main" xmlns:r="http://schemas.openxmlformats.org/officeDocument/2006/relationships" xmlns:p="http://schemas.openxmlformats.org/presentationml/2006/main">
+  <p:cSld>
+    <p:spTree>
+      <p:nvGrpSpPr>
+        <p:cNvPr id="1" name="">
+          <a:extLst>
+            <a:ext uri="{FF2B5EF4-FFF2-40B4-BE49-F238E27FC236}">
+              <a16:creationId xmlns:a16="http://schemas.microsoft.com/office/drawing/2014/main" id="{1D9CAE43-DB68-E8E4-7A98-FBA0A6571C34}"/>
+            </a:ext>
+          </a:extLst>
+        </p:cNvPr>
+        <p:cNvGrpSpPr/>
+        <p:nvPr/>
+      </p:nvGrpSpPr>
+      <p:grpSpPr>
+        <a:xfrm>
+          <a:off x="0" y="0"/>
+          <a:ext cx="0" cy="0"/>
+          <a:chOff x="0" y="0"/>
+          <a:chExt cx="0" cy="0"/>
+        </a:xfrm>
+      </p:grpSpPr>
+      <p:sp>
+        <p:nvSpPr>
+          <p:cNvPr id="2" name="Title 1">
+            <a:extLst>
+              <a:ext uri="{FF2B5EF4-FFF2-40B4-BE49-F238E27FC236}">
+                <a16:creationId xmlns:a16="http://schemas.microsoft.com/office/drawing/2014/main" id="{BF5661A0-F4AA-C732-20FD-904C37EB9C29}"/>
+              </a:ext>
+            </a:extLst>
+          </p:cNvPr>
+          <p:cNvSpPr>
+            <a:spLocks noGrp="1"/>
+          </p:cNvSpPr>
+          <p:nvPr>
+            <p:ph type="ctrTitle"/>
+          </p:nvPr>
+        </p:nvSpPr>
+        <p:spPr/>
+        <p:txBody>
+          <a:bodyPr/>
+          <a:lstStyle/>
+          <a:p>
+            <a:r>
+              <a:rPr lang="en-SE" b="1" dirty="0"/>
+              <a:t>Disease classfication</a:t>
+            </a:r>
+          </a:p>
+        </p:txBody>
+      </p:sp>
+    </p:spTree>
+    <p:extLst>
+      <p:ext uri="{BB962C8B-B14F-4D97-AF65-F5344CB8AC3E}">
+        <p14:creationId xmlns:p14="http://schemas.microsoft.com/office/powerpoint/2010/main" val="3732405524"/>
+      </p:ext>
+    </p:extLst>
+  </p:cSld>
+  <p:clrMapOvr>
+    <a:masterClrMapping/>
+  </p:clrMapOvr>
+</p:sld>
+</file>
+
+<file path=ppt/slides/slide12.xml><?xml version="1.0" encoding="utf-8"?>
+<p:sld xmlns:a="http://schemas.openxmlformats.org/drawingml/2006/main" xmlns:r="http://schemas.openxmlformats.org/officeDocument/2006/relationships" xmlns:p="http://schemas.openxmlformats.org/presentationml/2006/main">
+  <p:cSld>
+    <p:spTree>
+      <p:nvGrpSpPr>
+        <p:cNvPr id="1" name="">
+          <a:extLst>
+            <a:ext uri="{FF2B5EF4-FFF2-40B4-BE49-F238E27FC236}">
+              <a16:creationId xmlns:a16="http://schemas.microsoft.com/office/drawing/2014/main" id="{553603FC-EF88-6FF4-2ED4-8E675DB2B905}"/>
+            </a:ext>
+          </a:extLst>
+        </p:cNvPr>
+        <p:cNvGrpSpPr/>
+        <p:nvPr/>
+      </p:nvGrpSpPr>
+      <p:grpSpPr>
+        <a:xfrm>
+          <a:off x="0" y="0"/>
+          <a:ext cx="0" cy="0"/>
+          <a:chOff x="0" y="0"/>
+          <a:chExt cx="0" cy="0"/>
+        </a:xfrm>
+      </p:grpSpPr>
+      <p:sp>
+        <p:nvSpPr>
+          <p:cNvPr id="2" name="Title 1">
+            <a:extLst>
+              <a:ext uri="{FF2B5EF4-FFF2-40B4-BE49-F238E27FC236}">
+                <a16:creationId xmlns:a16="http://schemas.microsoft.com/office/drawing/2014/main" id="{F8BB6FE5-8EEB-5451-A157-2FD08260474D}"/>
+              </a:ext>
+            </a:extLst>
+          </p:cNvPr>
+          <p:cNvSpPr>
+            <a:spLocks noGrp="1"/>
+          </p:cNvSpPr>
+          <p:nvPr>
+            <p:ph type="title"/>
+          </p:nvPr>
+        </p:nvSpPr>
+        <p:spPr>
+          <a:xfrm>
+            <a:off x="0" y="1"/>
+            <a:ext cx="11065267" cy="658368"/>
+          </a:xfrm>
+        </p:spPr>
+        <p:txBody>
+          <a:bodyPr>
+            <a:normAutofit/>
+          </a:bodyPr>
+          <a:lstStyle/>
+          <a:p>
+            <a:r>
+              <a:rPr lang="en-US" dirty="0"/>
+              <a:t>ML </a:t>
+            </a:r>
+            <a:r>
+              <a:rPr lang="en-US" b="0" dirty="0"/>
+              <a:t>(separate)</a:t>
+            </a:r>
+            <a:endParaRPr lang="en-US" dirty="0"/>
+          </a:p>
+        </p:txBody>
+      </p:sp>
+    </p:spTree>
+    <p:extLst>
+      <p:ext uri="{BB962C8B-B14F-4D97-AF65-F5344CB8AC3E}">
+        <p14:creationId xmlns:p14="http://schemas.microsoft.com/office/powerpoint/2010/main" val="135984036"/>
+      </p:ext>
+    </p:extLst>
+  </p:cSld>
+  <p:clrMapOvr>
+    <a:masterClrMapping/>
+  </p:clrMapOvr>
+</p:sld>
+</file>
+
+<file path=ppt/slides/slide13.xml><?xml version="1.0" encoding="utf-8"?>
+<p:sld xmlns:a="http://schemas.openxmlformats.org/drawingml/2006/main" xmlns:r="http://schemas.openxmlformats.org/officeDocument/2006/relationships" xmlns:p="http://schemas.openxmlformats.org/presentationml/2006/main">
+  <p:cSld>
+    <p:spTree>
+      <p:nvGrpSpPr>
+        <p:cNvPr id="1" name="">
+          <a:extLst>
+            <a:ext uri="{FF2B5EF4-FFF2-40B4-BE49-F238E27FC236}">
+              <a16:creationId xmlns:a16="http://schemas.microsoft.com/office/drawing/2014/main" id="{7270C236-AD55-BD5F-0B1C-385DC2A841C1}"/>
+            </a:ext>
+          </a:extLst>
+        </p:cNvPr>
+        <p:cNvGrpSpPr/>
+        <p:nvPr/>
+      </p:nvGrpSpPr>
+      <p:grpSpPr>
+        <a:xfrm>
+          <a:off x="0" y="0"/>
+          <a:ext cx="0" cy="0"/>
+          <a:chOff x="0" y="0"/>
+          <a:chExt cx="0" cy="0"/>
+        </a:xfrm>
+      </p:grpSpPr>
+      <p:sp>
+        <p:nvSpPr>
+          <p:cNvPr id="2" name="Title 1">
+            <a:extLst>
+              <a:ext uri="{FF2B5EF4-FFF2-40B4-BE49-F238E27FC236}">
+                <a16:creationId xmlns:a16="http://schemas.microsoft.com/office/drawing/2014/main" id="{CB8C38E4-CF30-E9BC-8B3A-9080F0F159D2}"/>
+              </a:ext>
+            </a:extLst>
+          </p:cNvPr>
+          <p:cNvSpPr>
+            <a:spLocks noGrp="1"/>
+          </p:cNvSpPr>
+          <p:nvPr>
+            <p:ph type="title"/>
+          </p:nvPr>
+        </p:nvSpPr>
+        <p:spPr>
+          <a:xfrm>
+            <a:off x="0" y="1"/>
+            <a:ext cx="11065267" cy="658368"/>
+          </a:xfrm>
+        </p:spPr>
+        <p:txBody>
+          <a:bodyPr>
+            <a:normAutofit/>
+          </a:bodyPr>
+          <a:lstStyle/>
+          <a:p>
+            <a:r>
+              <a:rPr lang="en-US" dirty="0"/>
+              <a:t>ML </a:t>
+            </a:r>
+            <a:r>
+              <a:rPr lang="en-US" b="0" dirty="0"/>
+              <a:t>(together)</a:t>
+            </a:r>
+            <a:endParaRPr lang="en-US" dirty="0"/>
+          </a:p>
+        </p:txBody>
+      </p:sp>
+    </p:spTree>
+    <p:extLst>
+      <p:ext uri="{BB962C8B-B14F-4D97-AF65-F5344CB8AC3E}">
+        <p14:creationId xmlns:p14="http://schemas.microsoft.com/office/powerpoint/2010/main" val="1234593156"/>
+      </p:ext>
+    </p:extLst>
+  </p:cSld>
+  <p:clrMapOvr>
+    <a:masterClrMapping/>
+  </p:clrMapOvr>
+</p:sld>
+</file>
+
+<file path=ppt/slides/slide14.xml><?xml version="1.0" encoding="utf-8"?>
+<p:sld xmlns:a="http://schemas.openxmlformats.org/drawingml/2006/main" xmlns:r="http://schemas.openxmlformats.org/officeDocument/2006/relationships" xmlns:p="http://schemas.openxmlformats.org/presentationml/2006/main">
+  <p:cSld>
+    <p:spTree>
+      <p:nvGrpSpPr>
+        <p:cNvPr id="1" name="">
+          <a:extLst>
+            <a:ext uri="{FF2B5EF4-FFF2-40B4-BE49-F238E27FC236}">
+              <a16:creationId xmlns:a16="http://schemas.microsoft.com/office/drawing/2014/main" id="{BD7BF9EC-5C03-C3F7-A836-FCAB4B8C163E}"/>
+            </a:ext>
+          </a:extLst>
+        </p:cNvPr>
+        <p:cNvGrpSpPr/>
+        <p:nvPr/>
+      </p:nvGrpSpPr>
+      <p:grpSpPr>
+        <a:xfrm>
+          <a:off x="0" y="0"/>
+          <a:ext cx="0" cy="0"/>
+          <a:chOff x="0" y="0"/>
+          <a:chExt cx="0" cy="0"/>
+        </a:xfrm>
+      </p:grpSpPr>
+      <p:sp>
+        <p:nvSpPr>
+          <p:cNvPr id="2" name="Title 1">
+            <a:extLst>
+              <a:ext uri="{FF2B5EF4-FFF2-40B4-BE49-F238E27FC236}">
+                <a16:creationId xmlns:a16="http://schemas.microsoft.com/office/drawing/2014/main" id="{14D99F9F-8D5A-9690-23A4-278D33E13886}"/>
+              </a:ext>
+            </a:extLst>
+          </p:cNvPr>
+          <p:cNvSpPr>
+            <a:spLocks noGrp="1"/>
+          </p:cNvSpPr>
+          <p:nvPr>
+            <p:ph type="ctrTitle"/>
+          </p:nvPr>
+        </p:nvSpPr>
+        <p:spPr/>
+        <p:txBody>
+          <a:bodyPr/>
+          <a:lstStyle/>
+          <a:p>
+            <a:r>
+              <a:rPr lang="en-SE" b="1" dirty="0"/>
+              <a:t>Age prediction</a:t>
+            </a:r>
+          </a:p>
+        </p:txBody>
+      </p:sp>
+    </p:spTree>
+    <p:extLst>
+      <p:ext uri="{BB962C8B-B14F-4D97-AF65-F5344CB8AC3E}">
+        <p14:creationId xmlns:p14="http://schemas.microsoft.com/office/powerpoint/2010/main" val="2230848473"/>
+      </p:ext>
+    </p:extLst>
+  </p:cSld>
+  <p:clrMapOvr>
+    <a:masterClrMapping/>
+  </p:clrMapOvr>
+</p:sld>
+</file>
+
+<file path=ppt/slides/slide15.xml><?xml version="1.0" encoding="utf-8"?>
+<p:sld xmlns:a="http://schemas.openxmlformats.org/drawingml/2006/main" xmlns:r="http://schemas.openxmlformats.org/officeDocument/2006/relationships" xmlns:p="http://schemas.openxmlformats.org/presentationml/2006/main">
+  <p:cSld>
+    <p:spTree>
+      <p:nvGrpSpPr>
+        <p:cNvPr id="1" name="">
+          <a:extLst>
+            <a:ext uri="{FF2B5EF4-FFF2-40B4-BE49-F238E27FC236}">
+              <a16:creationId xmlns:a16="http://schemas.microsoft.com/office/drawing/2014/main" id="{4A799147-7B7B-88C9-DB3A-8BA6BAE7DEC5}"/>
+            </a:ext>
+          </a:extLst>
+        </p:cNvPr>
+        <p:cNvGrpSpPr/>
+        <p:nvPr/>
+      </p:nvGrpSpPr>
+      <p:grpSpPr>
+        <a:xfrm>
+          <a:off x="0" y="0"/>
+          <a:ext cx="0" cy="0"/>
+          <a:chOff x="0" y="0"/>
+          <a:chExt cx="0" cy="0"/>
+        </a:xfrm>
+      </p:grpSpPr>
+      <p:sp>
+        <p:nvSpPr>
+          <p:cNvPr id="2" name="Title 1">
+            <a:extLst>
+              <a:ext uri="{FF2B5EF4-FFF2-40B4-BE49-F238E27FC236}">
+                <a16:creationId xmlns:a16="http://schemas.microsoft.com/office/drawing/2014/main" id="{F0AD3F0F-F9A8-788E-0319-68E84902323B}"/>
+              </a:ext>
+            </a:extLst>
+          </p:cNvPr>
+          <p:cNvSpPr>
+            <a:spLocks noGrp="1"/>
+          </p:cNvSpPr>
+          <p:nvPr>
+            <p:ph type="title"/>
+          </p:nvPr>
+        </p:nvSpPr>
+        <p:spPr>
+          <a:xfrm>
+            <a:off x="0" y="1"/>
+            <a:ext cx="11065267" cy="658368"/>
+          </a:xfrm>
+        </p:spPr>
+        <p:txBody>
+          <a:bodyPr>
+            <a:normAutofit/>
+          </a:bodyPr>
+          <a:lstStyle/>
+          <a:p>
+            <a:r>
+              <a:rPr lang="en-US" dirty="0"/>
+              <a:t>ML </a:t>
+            </a:r>
+            <a:r>
+              <a:rPr lang="en-US" b="0" dirty="0"/>
+              <a:t>(together)</a:t>
+            </a:r>
+            <a:endParaRPr lang="en-US" dirty="0"/>
+          </a:p>
+        </p:txBody>
+      </p:sp>
+      <p:sp>
+        <p:nvSpPr>
+          <p:cNvPr id="3" name="TextBox 2">
+            <a:extLst>
+              <a:ext uri="{FF2B5EF4-FFF2-40B4-BE49-F238E27FC236}">
+                <a16:creationId xmlns:a16="http://schemas.microsoft.com/office/drawing/2014/main" id="{FCD675E4-09A9-8CD4-246B-058612265514}"/>
+              </a:ext>
+            </a:extLst>
+          </p:cNvPr>
+          <p:cNvSpPr txBox="1"/>
+          <p:nvPr/>
+        </p:nvSpPr>
+        <p:spPr>
+          <a:xfrm>
+            <a:off x="954593" y="6149591"/>
+            <a:ext cx="2619756" cy="646331"/>
+          </a:xfrm>
+          <a:prstGeom prst="rect">
+            <a:avLst/>
+          </a:prstGeom>
+          <a:noFill/>
+        </p:spPr>
+        <p:txBody>
+          <a:bodyPr wrap="none" rtlCol="0">
+            <a:spAutoFit/>
+          </a:bodyPr>
+          <a:lstStyle/>
+          <a:p>
+            <a:r>
+              <a:rPr lang="en-GB" dirty="0"/>
+              <a:t>* Excluded: UCAN cancers</a:t>
+            </a:r>
+          </a:p>
+          <a:p>
+            <a:endParaRPr lang="en-SE" dirty="0"/>
+          </a:p>
+        </p:txBody>
+      </p:sp>
+    </p:spTree>
+    <p:extLst>
+      <p:ext uri="{BB962C8B-B14F-4D97-AF65-F5344CB8AC3E}">
+        <p14:creationId xmlns:p14="http://schemas.microsoft.com/office/powerpoint/2010/main" val="3012780538"/>
+      </p:ext>
+    </p:extLst>
+  </p:cSld>
+  <p:clrMapOvr>
+    <a:masterClrMapping/>
+  </p:clrMapOvr>
+</p:sld>
+</file>
+
+<file path=ppt/slides/slide16.xml><?xml version="1.0" encoding="utf-8"?>
+<p:sld xmlns:a="http://schemas.openxmlformats.org/drawingml/2006/main" xmlns:r="http://schemas.openxmlformats.org/officeDocument/2006/relationships" xmlns:p="http://schemas.openxmlformats.org/presentationml/2006/main">
+  <p:cSld>
+    <p:spTree>
+      <p:nvGrpSpPr>
+        <p:cNvPr id="1" name="">
+          <a:extLst>
+            <a:ext uri="{FF2B5EF4-FFF2-40B4-BE49-F238E27FC236}">
               <a16:creationId xmlns:a16="http://schemas.microsoft.com/office/drawing/2014/main" id="{51AB06EB-DA6E-328D-8A05-3010A5E62E41}"/>
             </a:ext>
           </a:extLst>
@@ -6106,7 +7750,7 @@
 </p:sld>
 </file>
 
-<file path=ppt/slides/slide11.xml><?xml version="1.0" encoding="utf-8"?>
+<file path=ppt/slides/slide17.xml><?xml version="1.0" encoding="utf-8"?>
 <p:sld xmlns:a="http://schemas.openxmlformats.org/drawingml/2006/main" xmlns:r="http://schemas.openxmlformats.org/officeDocument/2006/relationships" xmlns:p="http://schemas.openxmlformats.org/presentationml/2006/main">
   <p:cSld>
     <p:spTree>
@@ -7487,7 +9131,7 @@
         </p:blipFill>
         <p:spPr>
           <a:xfrm>
-            <a:off x="2665967" y="776383"/>
+            <a:off x="2937272" y="776384"/>
             <a:ext cx="5497532" cy="5864034"/>
           </a:xfrm>
           <a:prstGeom prst="rect">
@@ -7516,6 +9160,147 @@
         <p:cNvPr id="1" name="">
           <a:extLst>
             <a:ext uri="{FF2B5EF4-FFF2-40B4-BE49-F238E27FC236}">
+              <a16:creationId xmlns:a16="http://schemas.microsoft.com/office/drawing/2014/main" id="{865530C2-5106-44FC-29C2-3590B50EEBA8}"/>
+            </a:ext>
+          </a:extLst>
+        </p:cNvPr>
+        <p:cNvGrpSpPr/>
+        <p:nvPr/>
+      </p:nvGrpSpPr>
+      <p:grpSpPr>
+        <a:xfrm>
+          <a:off x="0" y="0"/>
+          <a:ext cx="0" cy="0"/>
+          <a:chOff x="0" y="0"/>
+          <a:chExt cx="0" cy="0"/>
+        </a:xfrm>
+      </p:grpSpPr>
+      <p:sp>
+        <p:nvSpPr>
+          <p:cNvPr id="2" name="Title 1">
+            <a:extLst>
+              <a:ext uri="{FF2B5EF4-FFF2-40B4-BE49-F238E27FC236}">
+                <a16:creationId xmlns:a16="http://schemas.microsoft.com/office/drawing/2014/main" id="{85F4E0F6-17C0-9D33-C050-B079C64EE0CA}"/>
+              </a:ext>
+            </a:extLst>
+          </p:cNvPr>
+          <p:cNvSpPr>
+            <a:spLocks noGrp="1"/>
+          </p:cNvSpPr>
+          <p:nvPr>
+            <p:ph type="title"/>
+          </p:nvPr>
+        </p:nvSpPr>
+        <p:spPr>
+          <a:xfrm>
+            <a:off x="0" y="1"/>
+            <a:ext cx="11065267" cy="658368"/>
+          </a:xfrm>
+        </p:spPr>
+        <p:txBody>
+          <a:bodyPr>
+            <a:normAutofit/>
+          </a:bodyPr>
+          <a:lstStyle/>
+          <a:p>
+            <a:r>
+              <a:rPr lang="en-US" dirty="0"/>
+              <a:t>Number of samples</a:t>
+            </a:r>
+          </a:p>
+        </p:txBody>
+      </p:sp>
+      <p:pic>
+        <p:nvPicPr>
+          <p:cNvPr id="4" name="Picture 3">
+            <a:extLst>
+              <a:ext uri="{FF2B5EF4-FFF2-40B4-BE49-F238E27FC236}">
+                <a16:creationId xmlns:a16="http://schemas.microsoft.com/office/drawing/2014/main" id="{99749779-9F92-4C6E-09FC-0D88F998A2BA}"/>
+              </a:ext>
+            </a:extLst>
+          </p:cNvPr>
+          <p:cNvPicPr>
+            <a:picLocks noChangeAspect="1"/>
+          </p:cNvPicPr>
+          <p:nvPr/>
+        </p:nvPicPr>
+        <p:blipFill>
+          <a:blip r:embed="rId3"/>
+          <a:srcRect t="4498" b="2169"/>
+          <a:stretch>
+            <a:fillRect/>
+          </a:stretch>
+        </p:blipFill>
+        <p:spPr>
+          <a:xfrm>
+            <a:off x="194072" y="736190"/>
+            <a:ext cx="5497532" cy="5864034"/>
+          </a:xfrm>
+          <a:prstGeom prst="rect">
+            <a:avLst/>
+          </a:prstGeom>
+        </p:spPr>
+      </p:pic>
+      <p:sp>
+        <p:nvSpPr>
+          <p:cNvPr id="3" name="TextBox 2">
+            <a:extLst>
+              <a:ext uri="{FF2B5EF4-FFF2-40B4-BE49-F238E27FC236}">
+                <a16:creationId xmlns:a16="http://schemas.microsoft.com/office/drawing/2014/main" id="{2D32AB93-9985-F3A5-D125-3FBA9B594845}"/>
+              </a:ext>
+            </a:extLst>
+          </p:cNvPr>
+          <p:cNvSpPr txBox="1"/>
+          <p:nvPr/>
+        </p:nvSpPr>
+        <p:spPr>
+          <a:xfrm>
+            <a:off x="7114233" y="2893925"/>
+            <a:ext cx="1421608" cy="369332"/>
+          </a:xfrm>
+          <a:prstGeom prst="rect">
+            <a:avLst/>
+          </a:prstGeom>
+          <a:noFill/>
+        </p:spPr>
+        <p:txBody>
+          <a:bodyPr wrap="none" rtlCol="0">
+            <a:spAutoFit/>
+          </a:bodyPr>
+          <a:lstStyle/>
+          <a:p>
+            <a:r>
+              <a:rPr lang="en-GB" dirty="0"/>
+              <a:t>A</a:t>
+            </a:r>
+            <a:r>
+              <a:rPr lang="en-SE" dirty="0"/>
+              <a:t>ge, sex, bmi</a:t>
+            </a:r>
+          </a:p>
+        </p:txBody>
+      </p:sp>
+    </p:spTree>
+    <p:extLst>
+      <p:ext uri="{BB962C8B-B14F-4D97-AF65-F5344CB8AC3E}">
+        <p14:creationId xmlns:p14="http://schemas.microsoft.com/office/powerpoint/2010/main" val="2335048821"/>
+      </p:ext>
+    </p:extLst>
+  </p:cSld>
+  <p:clrMapOvr>
+    <a:masterClrMapping/>
+  </p:clrMapOvr>
+</p:sld>
+</file>
+
+<file path=ppt/slides/slide4.xml><?xml version="1.0" encoding="utf-8"?>
+<p:sld xmlns:a="http://schemas.openxmlformats.org/drawingml/2006/main" xmlns:r="http://schemas.openxmlformats.org/officeDocument/2006/relationships" xmlns:p="http://schemas.openxmlformats.org/presentationml/2006/main">
+  <p:cSld>
+    <p:spTree>
+      <p:nvGrpSpPr>
+        <p:cNvPr id="1" name="">
+          <a:extLst>
+            <a:ext uri="{FF2B5EF4-FFF2-40B4-BE49-F238E27FC236}">
               <a16:creationId xmlns:a16="http://schemas.microsoft.com/office/drawing/2014/main" id="{07D7EF3C-251D-3B02-3C92-C352B49B16BD}"/>
             </a:ext>
           </a:extLst>
@@ -7566,6 +9351,36 @@
           </a:p>
         </p:txBody>
       </p:sp>
+      <p:pic>
+        <p:nvPicPr>
+          <p:cNvPr id="4" name="Picture 3" descr="A screenshot of a map&#10;&#10;AI-generated content may be incorrect.">
+            <a:extLst>
+              <a:ext uri="{FF2B5EF4-FFF2-40B4-BE49-F238E27FC236}">
+                <a16:creationId xmlns:a16="http://schemas.microsoft.com/office/drawing/2014/main" id="{C157FDC6-DF78-F62C-11F3-C0AE70D694ED}"/>
+              </a:ext>
+            </a:extLst>
+          </p:cNvPr>
+          <p:cNvPicPr>
+            <a:picLocks noChangeAspect="1"/>
+          </p:cNvPicPr>
+          <p:nvPr/>
+        </p:nvPicPr>
+        <p:blipFill>
+          <a:blip r:embed="rId3"/>
+          <a:stretch>
+            <a:fillRect/>
+          </a:stretch>
+        </p:blipFill>
+        <p:spPr>
+          <a:xfrm>
+            <a:off x="679938" y="855809"/>
+            <a:ext cx="11065267" cy="5532634"/>
+          </a:xfrm>
+          <a:prstGeom prst="rect">
+            <a:avLst/>
+          </a:prstGeom>
+        </p:spPr>
+      </p:pic>
     </p:spTree>
     <p:extLst>
       <p:ext uri="{BB962C8B-B14F-4D97-AF65-F5344CB8AC3E}">
@@ -7579,7 +9394,220 @@
 </p:sld>
 </file>
 
-<file path=ppt/slides/slide4.xml><?xml version="1.0" encoding="utf-8"?>
+<file path=ppt/slides/slide5.xml><?xml version="1.0" encoding="utf-8"?>
+<p:sld xmlns:a="http://schemas.openxmlformats.org/drawingml/2006/main" xmlns:r="http://schemas.openxmlformats.org/officeDocument/2006/relationships" xmlns:p="http://schemas.openxmlformats.org/presentationml/2006/main">
+  <p:cSld>
+    <p:spTree>
+      <p:nvGrpSpPr>
+        <p:cNvPr id="1" name="">
+          <a:extLst>
+            <a:ext uri="{FF2B5EF4-FFF2-40B4-BE49-F238E27FC236}">
+              <a16:creationId xmlns:a16="http://schemas.microsoft.com/office/drawing/2014/main" id="{F3FAEF2C-589A-DECA-4E93-3886F6A346C3}"/>
+            </a:ext>
+          </a:extLst>
+        </p:cNvPr>
+        <p:cNvGrpSpPr/>
+        <p:nvPr/>
+      </p:nvGrpSpPr>
+      <p:grpSpPr>
+        <a:xfrm>
+          <a:off x="0" y="0"/>
+          <a:ext cx="0" cy="0"/>
+          <a:chOff x="0" y="0"/>
+          <a:chExt cx="0" cy="0"/>
+        </a:xfrm>
+      </p:grpSpPr>
+      <p:sp>
+        <p:nvSpPr>
+          <p:cNvPr id="2" name="Title 1">
+            <a:extLst>
+              <a:ext uri="{FF2B5EF4-FFF2-40B4-BE49-F238E27FC236}">
+                <a16:creationId xmlns:a16="http://schemas.microsoft.com/office/drawing/2014/main" id="{B1A66981-8E2D-39AE-99A8-552B00251ADA}"/>
+              </a:ext>
+            </a:extLst>
+          </p:cNvPr>
+          <p:cNvSpPr>
+            <a:spLocks noGrp="1"/>
+          </p:cNvSpPr>
+          <p:nvPr>
+            <p:ph type="title"/>
+          </p:nvPr>
+        </p:nvSpPr>
+        <p:spPr>
+          <a:xfrm>
+            <a:off x="0" y="1"/>
+            <a:ext cx="11065267" cy="658368"/>
+          </a:xfrm>
+        </p:spPr>
+        <p:txBody>
+          <a:bodyPr>
+            <a:normAutofit/>
+          </a:bodyPr>
+          <a:lstStyle/>
+          <a:p>
+            <a:r>
+              <a:rPr lang="en-US" dirty="0"/>
+              <a:t>Number of proteins</a:t>
+            </a:r>
+          </a:p>
+        </p:txBody>
+      </p:sp>
+    </p:spTree>
+    <p:extLst>
+      <p:ext uri="{BB962C8B-B14F-4D97-AF65-F5344CB8AC3E}">
+        <p14:creationId xmlns:p14="http://schemas.microsoft.com/office/powerpoint/2010/main" val="1984819609"/>
+      </p:ext>
+    </p:extLst>
+  </p:cSld>
+  <p:clrMapOvr>
+    <a:masterClrMapping/>
+  </p:clrMapOvr>
+</p:sld>
+</file>
+
+<file path=ppt/slides/slide6.xml><?xml version="1.0" encoding="utf-8"?>
+<p:sld xmlns:a="http://schemas.openxmlformats.org/drawingml/2006/main" xmlns:r="http://schemas.openxmlformats.org/officeDocument/2006/relationships" xmlns:p="http://schemas.openxmlformats.org/presentationml/2006/main">
+  <p:cSld>
+    <p:spTree>
+      <p:nvGrpSpPr>
+        <p:cNvPr id="1" name="">
+          <a:extLst>
+            <a:ext uri="{FF2B5EF4-FFF2-40B4-BE49-F238E27FC236}">
+              <a16:creationId xmlns:a16="http://schemas.microsoft.com/office/drawing/2014/main" id="{EA4D1A84-B6E1-5183-283E-C854009BED13}"/>
+            </a:ext>
+          </a:extLst>
+        </p:cNvPr>
+        <p:cNvGrpSpPr/>
+        <p:nvPr/>
+      </p:nvGrpSpPr>
+      <p:grpSpPr>
+        <a:xfrm>
+          <a:off x="0" y="0"/>
+          <a:ext cx="0" cy="0"/>
+          <a:chOff x="0" y="0"/>
+          <a:chExt cx="0" cy="0"/>
+        </a:xfrm>
+      </p:grpSpPr>
+      <p:sp>
+        <p:nvSpPr>
+          <p:cNvPr id="2" name="Title 1">
+            <a:extLst>
+              <a:ext uri="{FF2B5EF4-FFF2-40B4-BE49-F238E27FC236}">
+                <a16:creationId xmlns:a16="http://schemas.microsoft.com/office/drawing/2014/main" id="{C145D9CD-C06C-366B-18C7-B3ED8ABD5B17}"/>
+              </a:ext>
+            </a:extLst>
+          </p:cNvPr>
+          <p:cNvSpPr>
+            <a:spLocks noGrp="1"/>
+          </p:cNvSpPr>
+          <p:nvPr>
+            <p:ph type="title"/>
+          </p:nvPr>
+        </p:nvSpPr>
+        <p:spPr>
+          <a:xfrm>
+            <a:off x="0" y="1"/>
+            <a:ext cx="11065267" cy="658368"/>
+          </a:xfrm>
+        </p:spPr>
+        <p:txBody>
+          <a:bodyPr>
+            <a:normAutofit/>
+          </a:bodyPr>
+          <a:lstStyle/>
+          <a:p>
+            <a:r>
+              <a:rPr lang="en-US" dirty="0"/>
+              <a:t>Number of aptamers per protein</a:t>
+            </a:r>
+          </a:p>
+        </p:txBody>
+      </p:sp>
+    </p:spTree>
+    <p:extLst>
+      <p:ext uri="{BB962C8B-B14F-4D97-AF65-F5344CB8AC3E}">
+        <p14:creationId xmlns:p14="http://schemas.microsoft.com/office/powerpoint/2010/main" val="3424386674"/>
+      </p:ext>
+    </p:extLst>
+  </p:cSld>
+  <p:clrMapOvr>
+    <a:masterClrMapping/>
+  </p:clrMapOvr>
+</p:sld>
+</file>
+
+<file path=ppt/slides/slide7.xml><?xml version="1.0" encoding="utf-8"?>
+<p:sld xmlns:a="http://schemas.openxmlformats.org/drawingml/2006/main" xmlns:r="http://schemas.openxmlformats.org/officeDocument/2006/relationships" xmlns:p="http://schemas.openxmlformats.org/presentationml/2006/main">
+  <p:cSld>
+    <p:spTree>
+      <p:nvGrpSpPr>
+        <p:cNvPr id="1" name="">
+          <a:extLst>
+            <a:ext uri="{FF2B5EF4-FFF2-40B4-BE49-F238E27FC236}">
+              <a16:creationId xmlns:a16="http://schemas.microsoft.com/office/drawing/2014/main" id="{CE681B19-2B27-5BFC-F386-33C845310EA9}"/>
+            </a:ext>
+          </a:extLst>
+        </p:cNvPr>
+        <p:cNvGrpSpPr/>
+        <p:nvPr/>
+      </p:nvGrpSpPr>
+      <p:grpSpPr>
+        <a:xfrm>
+          <a:off x="0" y="0"/>
+          <a:ext cx="0" cy="0"/>
+          <a:chOff x="0" y="0"/>
+          <a:chExt cx="0" cy="0"/>
+        </a:xfrm>
+      </p:grpSpPr>
+      <p:sp>
+        <p:nvSpPr>
+          <p:cNvPr id="2" name="Title 1">
+            <a:extLst>
+              <a:ext uri="{FF2B5EF4-FFF2-40B4-BE49-F238E27FC236}">
+                <a16:creationId xmlns:a16="http://schemas.microsoft.com/office/drawing/2014/main" id="{EAB3B609-8DE1-C84D-A0B1-69E3921AEB3C}"/>
+              </a:ext>
+            </a:extLst>
+          </p:cNvPr>
+          <p:cNvSpPr>
+            <a:spLocks noGrp="1"/>
+          </p:cNvSpPr>
+          <p:nvPr>
+            <p:ph type="title"/>
+          </p:nvPr>
+        </p:nvSpPr>
+        <p:spPr>
+          <a:xfrm>
+            <a:off x="0" y="1"/>
+            <a:ext cx="11065267" cy="658368"/>
+          </a:xfrm>
+        </p:spPr>
+        <p:txBody>
+          <a:bodyPr>
+            <a:normAutofit/>
+          </a:bodyPr>
+          <a:lstStyle/>
+          <a:p>
+            <a:r>
+              <a:rPr lang="en-US" dirty="0"/>
+              <a:t>Number of aptamers per protein</a:t>
+            </a:r>
+          </a:p>
+        </p:txBody>
+      </p:sp>
+    </p:spTree>
+    <p:extLst>
+      <p:ext uri="{BB962C8B-B14F-4D97-AF65-F5344CB8AC3E}">
+        <p14:creationId xmlns:p14="http://schemas.microsoft.com/office/powerpoint/2010/main" val="2028564394"/>
+      </p:ext>
+    </p:extLst>
+  </p:cSld>
+  <p:clrMapOvr>
+    <a:masterClrMapping/>
+  </p:clrMapOvr>
+</p:sld>
+</file>
+
+<file path=ppt/slides/slide8.xml><?xml version="1.0" encoding="utf-8"?>
 <p:sld xmlns:a="http://schemas.openxmlformats.org/drawingml/2006/main" xmlns:r="http://schemas.openxmlformats.org/officeDocument/2006/relationships" xmlns:p="http://schemas.openxmlformats.org/presentationml/2006/main">
   <p:cSld>
     <p:spTree>
@@ -7632,295 +9660,54 @@
           <a:p>
             <a:r>
               <a:rPr lang="en-US" dirty="0"/>
-              <a:t>Variance explained</a:t>
-            </a:r>
-          </a:p>
-        </p:txBody>
-      </p:sp>
+              <a:t>Variance explained </a:t>
+            </a:r>
+            <a:r>
+              <a:rPr lang="en-US" b="0" dirty="0"/>
+              <a:t>- </a:t>
+            </a:r>
+            <a:r>
+              <a:rPr lang="en-US" b="0" dirty="0" err="1"/>
+              <a:t>Olink</a:t>
+            </a:r>
+            <a:endParaRPr lang="en-US" dirty="0"/>
+          </a:p>
+        </p:txBody>
+      </p:sp>
+      <p:pic>
+        <p:nvPicPr>
+          <p:cNvPr id="4" name="Picture 3">
+            <a:extLst>
+              <a:ext uri="{FF2B5EF4-FFF2-40B4-BE49-F238E27FC236}">
+                <a16:creationId xmlns:a16="http://schemas.microsoft.com/office/drawing/2014/main" id="{EFDF38A1-2E58-9186-2B70-C417AB9EDABC}"/>
+              </a:ext>
+            </a:extLst>
+          </p:cNvPr>
+          <p:cNvPicPr>
+            <a:picLocks noChangeAspect="1"/>
+          </p:cNvPicPr>
+          <p:nvPr/>
+        </p:nvPicPr>
+        <p:blipFill>
+          <a:blip r:embed="rId3"/>
+          <a:stretch>
+            <a:fillRect/>
+          </a:stretch>
+        </p:blipFill>
+        <p:spPr>
+          <a:xfrm>
+            <a:off x="228600" y="807721"/>
+            <a:ext cx="11734800" cy="5867400"/>
+          </a:xfrm>
+          <a:prstGeom prst="rect">
+            <a:avLst/>
+          </a:prstGeom>
+        </p:spPr>
+      </p:pic>
     </p:spTree>
     <p:extLst>
       <p:ext uri="{BB962C8B-B14F-4D97-AF65-F5344CB8AC3E}">
         <p14:creationId xmlns:p14="http://schemas.microsoft.com/office/powerpoint/2010/main" val="3927483690"/>
-      </p:ext>
-    </p:extLst>
-  </p:cSld>
-  <p:clrMapOvr>
-    <a:masterClrMapping/>
-  </p:clrMapOvr>
-</p:sld>
-</file>
-
-<file path=ppt/slides/slide5.xml><?xml version="1.0" encoding="utf-8"?>
-<p:sld xmlns:a="http://schemas.openxmlformats.org/drawingml/2006/main" xmlns:r="http://schemas.openxmlformats.org/officeDocument/2006/relationships" xmlns:p="http://schemas.openxmlformats.org/presentationml/2006/main">
-  <p:cSld>
-    <p:spTree>
-      <p:nvGrpSpPr>
-        <p:cNvPr id="1" name="">
-          <a:extLst>
-            <a:ext uri="{FF2B5EF4-FFF2-40B4-BE49-F238E27FC236}">
-              <a16:creationId xmlns:a16="http://schemas.microsoft.com/office/drawing/2014/main" id="{1D9CAE43-DB68-E8E4-7A98-FBA0A6571C34}"/>
-            </a:ext>
-          </a:extLst>
-        </p:cNvPr>
-        <p:cNvGrpSpPr/>
-        <p:nvPr/>
-      </p:nvGrpSpPr>
-      <p:grpSpPr>
-        <a:xfrm>
-          <a:off x="0" y="0"/>
-          <a:ext cx="0" cy="0"/>
-          <a:chOff x="0" y="0"/>
-          <a:chExt cx="0" cy="0"/>
-        </a:xfrm>
-      </p:grpSpPr>
-      <p:sp>
-        <p:nvSpPr>
-          <p:cNvPr id="2" name="Title 1">
-            <a:extLst>
-              <a:ext uri="{FF2B5EF4-FFF2-40B4-BE49-F238E27FC236}">
-                <a16:creationId xmlns:a16="http://schemas.microsoft.com/office/drawing/2014/main" id="{BF5661A0-F4AA-C732-20FD-904C37EB9C29}"/>
-              </a:ext>
-            </a:extLst>
-          </p:cNvPr>
-          <p:cNvSpPr>
-            <a:spLocks noGrp="1"/>
-          </p:cNvSpPr>
-          <p:nvPr>
-            <p:ph type="ctrTitle"/>
-          </p:nvPr>
-        </p:nvSpPr>
-        <p:spPr/>
-        <p:txBody>
-          <a:bodyPr/>
-          <a:lstStyle/>
-          <a:p>
-            <a:r>
-              <a:rPr lang="en-SE" b="1" dirty="0"/>
-              <a:t>Disease classfication</a:t>
-            </a:r>
-          </a:p>
-        </p:txBody>
-      </p:sp>
-    </p:spTree>
-    <p:extLst>
-      <p:ext uri="{BB962C8B-B14F-4D97-AF65-F5344CB8AC3E}">
-        <p14:creationId xmlns:p14="http://schemas.microsoft.com/office/powerpoint/2010/main" val="3732405524"/>
-      </p:ext>
-    </p:extLst>
-  </p:cSld>
-  <p:clrMapOvr>
-    <a:masterClrMapping/>
-  </p:clrMapOvr>
-</p:sld>
-</file>
-
-<file path=ppt/slides/slide6.xml><?xml version="1.0" encoding="utf-8"?>
-<p:sld xmlns:a="http://schemas.openxmlformats.org/drawingml/2006/main" xmlns:r="http://schemas.openxmlformats.org/officeDocument/2006/relationships" xmlns:p="http://schemas.openxmlformats.org/presentationml/2006/main">
-  <p:cSld>
-    <p:spTree>
-      <p:nvGrpSpPr>
-        <p:cNvPr id="1" name="">
-          <a:extLst>
-            <a:ext uri="{FF2B5EF4-FFF2-40B4-BE49-F238E27FC236}">
-              <a16:creationId xmlns:a16="http://schemas.microsoft.com/office/drawing/2014/main" id="{553603FC-EF88-6FF4-2ED4-8E675DB2B905}"/>
-            </a:ext>
-          </a:extLst>
-        </p:cNvPr>
-        <p:cNvGrpSpPr/>
-        <p:nvPr/>
-      </p:nvGrpSpPr>
-      <p:grpSpPr>
-        <a:xfrm>
-          <a:off x="0" y="0"/>
-          <a:ext cx="0" cy="0"/>
-          <a:chOff x="0" y="0"/>
-          <a:chExt cx="0" cy="0"/>
-        </a:xfrm>
-      </p:grpSpPr>
-      <p:sp>
-        <p:nvSpPr>
-          <p:cNvPr id="2" name="Title 1">
-            <a:extLst>
-              <a:ext uri="{FF2B5EF4-FFF2-40B4-BE49-F238E27FC236}">
-                <a16:creationId xmlns:a16="http://schemas.microsoft.com/office/drawing/2014/main" id="{F8BB6FE5-8EEB-5451-A157-2FD08260474D}"/>
-              </a:ext>
-            </a:extLst>
-          </p:cNvPr>
-          <p:cNvSpPr>
-            <a:spLocks noGrp="1"/>
-          </p:cNvSpPr>
-          <p:nvPr>
-            <p:ph type="title"/>
-          </p:nvPr>
-        </p:nvSpPr>
-        <p:spPr>
-          <a:xfrm>
-            <a:off x="0" y="1"/>
-            <a:ext cx="11065267" cy="658368"/>
-          </a:xfrm>
-        </p:spPr>
-        <p:txBody>
-          <a:bodyPr>
-            <a:normAutofit/>
-          </a:bodyPr>
-          <a:lstStyle/>
-          <a:p>
-            <a:r>
-              <a:rPr lang="en-US" dirty="0"/>
-              <a:t>ML </a:t>
-            </a:r>
-            <a:r>
-              <a:rPr lang="en-US" b="0" dirty="0"/>
-              <a:t>(separate)</a:t>
-            </a:r>
-            <a:endParaRPr lang="en-US" dirty="0"/>
-          </a:p>
-        </p:txBody>
-      </p:sp>
-    </p:spTree>
-    <p:extLst>
-      <p:ext uri="{BB962C8B-B14F-4D97-AF65-F5344CB8AC3E}">
-        <p14:creationId xmlns:p14="http://schemas.microsoft.com/office/powerpoint/2010/main" val="135984036"/>
-      </p:ext>
-    </p:extLst>
-  </p:cSld>
-  <p:clrMapOvr>
-    <a:masterClrMapping/>
-  </p:clrMapOvr>
-</p:sld>
-</file>
-
-<file path=ppt/slides/slide7.xml><?xml version="1.0" encoding="utf-8"?>
-<p:sld xmlns:a="http://schemas.openxmlformats.org/drawingml/2006/main" xmlns:r="http://schemas.openxmlformats.org/officeDocument/2006/relationships" xmlns:p="http://schemas.openxmlformats.org/presentationml/2006/main">
-  <p:cSld>
-    <p:spTree>
-      <p:nvGrpSpPr>
-        <p:cNvPr id="1" name="">
-          <a:extLst>
-            <a:ext uri="{FF2B5EF4-FFF2-40B4-BE49-F238E27FC236}">
-              <a16:creationId xmlns:a16="http://schemas.microsoft.com/office/drawing/2014/main" id="{7270C236-AD55-BD5F-0B1C-385DC2A841C1}"/>
-            </a:ext>
-          </a:extLst>
-        </p:cNvPr>
-        <p:cNvGrpSpPr/>
-        <p:nvPr/>
-      </p:nvGrpSpPr>
-      <p:grpSpPr>
-        <a:xfrm>
-          <a:off x="0" y="0"/>
-          <a:ext cx="0" cy="0"/>
-          <a:chOff x="0" y="0"/>
-          <a:chExt cx="0" cy="0"/>
-        </a:xfrm>
-      </p:grpSpPr>
-      <p:sp>
-        <p:nvSpPr>
-          <p:cNvPr id="2" name="Title 1">
-            <a:extLst>
-              <a:ext uri="{FF2B5EF4-FFF2-40B4-BE49-F238E27FC236}">
-                <a16:creationId xmlns:a16="http://schemas.microsoft.com/office/drawing/2014/main" id="{CB8C38E4-CF30-E9BC-8B3A-9080F0F159D2}"/>
-              </a:ext>
-            </a:extLst>
-          </p:cNvPr>
-          <p:cNvSpPr>
-            <a:spLocks noGrp="1"/>
-          </p:cNvSpPr>
-          <p:nvPr>
-            <p:ph type="title"/>
-          </p:nvPr>
-        </p:nvSpPr>
-        <p:spPr>
-          <a:xfrm>
-            <a:off x="0" y="1"/>
-            <a:ext cx="11065267" cy="658368"/>
-          </a:xfrm>
-        </p:spPr>
-        <p:txBody>
-          <a:bodyPr>
-            <a:normAutofit/>
-          </a:bodyPr>
-          <a:lstStyle/>
-          <a:p>
-            <a:r>
-              <a:rPr lang="en-US" dirty="0"/>
-              <a:t>ML </a:t>
-            </a:r>
-            <a:r>
-              <a:rPr lang="en-US" b="0" dirty="0"/>
-              <a:t>(together)</a:t>
-            </a:r>
-            <a:endParaRPr lang="en-US" dirty="0"/>
-          </a:p>
-        </p:txBody>
-      </p:sp>
-    </p:spTree>
-    <p:extLst>
-      <p:ext uri="{BB962C8B-B14F-4D97-AF65-F5344CB8AC3E}">
-        <p14:creationId xmlns:p14="http://schemas.microsoft.com/office/powerpoint/2010/main" val="1234593156"/>
-      </p:ext>
-    </p:extLst>
-  </p:cSld>
-  <p:clrMapOvr>
-    <a:masterClrMapping/>
-  </p:clrMapOvr>
-</p:sld>
-</file>
-
-<file path=ppt/slides/slide8.xml><?xml version="1.0" encoding="utf-8"?>
-<p:sld xmlns:a="http://schemas.openxmlformats.org/drawingml/2006/main" xmlns:r="http://schemas.openxmlformats.org/officeDocument/2006/relationships" xmlns:p="http://schemas.openxmlformats.org/presentationml/2006/main">
-  <p:cSld>
-    <p:spTree>
-      <p:nvGrpSpPr>
-        <p:cNvPr id="1" name="">
-          <a:extLst>
-            <a:ext uri="{FF2B5EF4-FFF2-40B4-BE49-F238E27FC236}">
-              <a16:creationId xmlns:a16="http://schemas.microsoft.com/office/drawing/2014/main" id="{BD7BF9EC-5C03-C3F7-A836-FCAB4B8C163E}"/>
-            </a:ext>
-          </a:extLst>
-        </p:cNvPr>
-        <p:cNvGrpSpPr/>
-        <p:nvPr/>
-      </p:nvGrpSpPr>
-      <p:grpSpPr>
-        <a:xfrm>
-          <a:off x="0" y="0"/>
-          <a:ext cx="0" cy="0"/>
-          <a:chOff x="0" y="0"/>
-          <a:chExt cx="0" cy="0"/>
-        </a:xfrm>
-      </p:grpSpPr>
-      <p:sp>
-        <p:nvSpPr>
-          <p:cNvPr id="2" name="Title 1">
-            <a:extLst>
-              <a:ext uri="{FF2B5EF4-FFF2-40B4-BE49-F238E27FC236}">
-                <a16:creationId xmlns:a16="http://schemas.microsoft.com/office/drawing/2014/main" id="{14D99F9F-8D5A-9690-23A4-278D33E13886}"/>
-              </a:ext>
-            </a:extLst>
-          </p:cNvPr>
-          <p:cNvSpPr>
-            <a:spLocks noGrp="1"/>
-          </p:cNvSpPr>
-          <p:nvPr>
-            <p:ph type="ctrTitle"/>
-          </p:nvPr>
-        </p:nvSpPr>
-        <p:spPr/>
-        <p:txBody>
-          <a:bodyPr/>
-          <a:lstStyle/>
-          <a:p>
-            <a:r>
-              <a:rPr lang="en-SE" b="1" dirty="0"/>
-              <a:t>Age prediction</a:t>
-            </a:r>
-          </a:p>
-        </p:txBody>
-      </p:sp>
-    </p:spTree>
-    <p:extLst>
-      <p:ext uri="{BB962C8B-B14F-4D97-AF65-F5344CB8AC3E}">
-        <p14:creationId xmlns:p14="http://schemas.microsoft.com/office/powerpoint/2010/main" val="2230848473"/>
       </p:ext>
     </p:extLst>
   </p:cSld>
@@ -7938,7 +9725,7 @@
         <p:cNvPr id="1" name="">
           <a:extLst>
             <a:ext uri="{FF2B5EF4-FFF2-40B4-BE49-F238E27FC236}">
-              <a16:creationId xmlns:a16="http://schemas.microsoft.com/office/drawing/2014/main" id="{4A799147-7B7B-88C9-DB3A-8BA6BAE7DEC5}"/>
+              <a16:creationId xmlns:a16="http://schemas.microsoft.com/office/drawing/2014/main" id="{6943581A-FE49-FA57-6654-411A1DDCC9EC}"/>
             </a:ext>
           </a:extLst>
         </p:cNvPr>
@@ -7958,7 +9745,7 @@
           <p:cNvPr id="2" name="Title 1">
             <a:extLst>
               <a:ext uri="{FF2B5EF4-FFF2-40B4-BE49-F238E27FC236}">
-                <a16:creationId xmlns:a16="http://schemas.microsoft.com/office/drawing/2014/main" id="{F0AD3F0F-F9A8-788E-0319-68E84902323B}"/>
+                <a16:creationId xmlns:a16="http://schemas.microsoft.com/office/drawing/2014/main" id="{05AC896B-B1F7-5DC6-4147-9C038486EF56}"/>
               </a:ext>
             </a:extLst>
           </p:cNvPr>
@@ -7983,58 +9770,54 @@
           <a:p>
             <a:r>
               <a:rPr lang="en-US" dirty="0"/>
-              <a:t>ML </a:t>
+              <a:t>Variance explained </a:t>
             </a:r>
             <a:r>
               <a:rPr lang="en-US" b="0" dirty="0"/>
-              <a:t>(together)</a:t>
+              <a:t>- </a:t>
+            </a:r>
+            <a:r>
+              <a:rPr lang="en-US" b="0" dirty="0" err="1"/>
+              <a:t>Somalogic</a:t>
             </a:r>
             <a:endParaRPr lang="en-US" dirty="0"/>
           </a:p>
         </p:txBody>
       </p:sp>
-      <p:sp>
-        <p:nvSpPr>
-          <p:cNvPr id="3" name="TextBox 2">
+      <p:pic>
+        <p:nvPicPr>
+          <p:cNvPr id="4" name="Picture 3">
             <a:extLst>
               <a:ext uri="{FF2B5EF4-FFF2-40B4-BE49-F238E27FC236}">
-                <a16:creationId xmlns:a16="http://schemas.microsoft.com/office/drawing/2014/main" id="{FCD675E4-09A9-8CD4-246B-058612265514}"/>
+                <a16:creationId xmlns:a16="http://schemas.microsoft.com/office/drawing/2014/main" id="{E5FC9BF7-093E-8AAA-87A7-01916337AA3E}"/>
               </a:ext>
             </a:extLst>
           </p:cNvPr>
-          <p:cNvSpPr txBox="1"/>
+          <p:cNvPicPr>
+            <a:picLocks noChangeAspect="1"/>
+          </p:cNvPicPr>
           <p:nvPr/>
-        </p:nvSpPr>
+        </p:nvPicPr>
+        <p:blipFill>
+          <a:blip r:embed="rId3"/>
+          <a:stretch>
+            <a:fillRect/>
+          </a:stretch>
+        </p:blipFill>
         <p:spPr>
           <a:xfrm>
-            <a:off x="954593" y="6149591"/>
-            <a:ext cx="2619756" cy="646331"/>
+            <a:off x="228600" y="807721"/>
+            <a:ext cx="11734800" cy="5867400"/>
           </a:xfrm>
           <a:prstGeom prst="rect">
             <a:avLst/>
           </a:prstGeom>
-          <a:noFill/>
         </p:spPr>
-        <p:txBody>
-          <a:bodyPr wrap="none" rtlCol="0">
-            <a:spAutoFit/>
-          </a:bodyPr>
-          <a:lstStyle/>
-          <a:p>
-            <a:r>
-              <a:rPr lang="en-GB" dirty="0"/>
-              <a:t>* Excluded: UCAN cancers</a:t>
-            </a:r>
-          </a:p>
-          <a:p>
-            <a:endParaRPr lang="en-SE" dirty="0"/>
-          </a:p>
-        </p:txBody>
-      </p:sp>
+      </p:pic>
     </p:spTree>
     <p:extLst>
       <p:ext uri="{BB962C8B-B14F-4D97-AF65-F5344CB8AC3E}">
-        <p14:creationId xmlns:p14="http://schemas.microsoft.com/office/powerpoint/2010/main" val="3012780538"/>
+        <p14:creationId xmlns:p14="http://schemas.microsoft.com/office/powerpoint/2010/main" val="3041482597"/>
       </p:ext>
     </p:extLst>
   </p:cSld>

</xml_diff>